<commit_message>
First Version Modules - Matlab version
</commit_message>
<xml_diff>
--- a/Algo/Documentation/Bypassing obstacles on SW modules flow chart.pptx
+++ b/Algo/Documentation/Bypassing obstacles on SW modules flow chart.pptx
@@ -5,8 +5,12 @@
     <p:sldMasterId id="2147483648" r:id="rId1"/>
   </p:sldMasterIdLst>
   <p:sldIdLst>
-    <p:sldId id="257" r:id="rId2"/>
-    <p:sldId id="258" r:id="rId3"/>
+    <p:sldId id="259" r:id="rId2"/>
+    <p:sldId id="260" r:id="rId3"/>
+    <p:sldId id="258" r:id="rId4"/>
+    <p:sldId id="257" r:id="rId5"/>
+    <p:sldId id="261" r:id="rId6"/>
+    <p:sldId id="262" r:id="rId7"/>
   </p:sldIdLst>
   <p:sldSz cx="12192000" cy="6858000"/>
   <p:notesSz cx="6858000" cy="9144000"/>
@@ -105,6 +109,11 @@
       </a:defRPr>
     </a:lvl9pPr>
   </p:defaultTextStyle>
+  <p:extLst>
+    <p:ext uri="{EFAFB233-063F-42B5-8137-9DF3F51BA10A}">
+      <p15:sldGuideLst xmlns:p15="http://schemas.microsoft.com/office/powerpoint/2012/main"/>
+    </p:ext>
+  </p:extLst>
 </p:presentation>
 </file>
 
@@ -150,10 +159,9 @@
           </a:lstStyle>
           <a:p>
             <a:r>
-              <a:rPr lang="en-US" smtClean="0"/>
+              <a:rPr lang="en-US"/>
               <a:t>Click to edit Master title style</a:t>
             </a:r>
-            <a:endParaRPr lang="en-US"/>
           </a:p>
         </p:txBody>
       </p:sp>
@@ -215,10 +223,9 @@
           </a:lstStyle>
           <a:p>
             <a:r>
-              <a:rPr lang="en-US" smtClean="0"/>
+              <a:rPr lang="en-US"/>
               <a:t>Click to edit Master subtitle style</a:t>
             </a:r>
-            <a:endParaRPr lang="en-US"/>
           </a:p>
         </p:txBody>
       </p:sp>
@@ -239,7 +246,7 @@
           <a:p>
             <a:fld id="{A1B0DC63-3121-4D79-A9B3-098D8DDFF5F5}" type="datetimeFigureOut">
               <a:rPr lang="en-US" smtClean="0"/>
-              <a:t>10/29/2021</a:t>
+              <a:t>11/11/2021</a:t>
             </a:fld>
             <a:endParaRPr lang="en-US"/>
           </a:p>
@@ -333,10 +340,9 @@
           <a:lstStyle/>
           <a:p>
             <a:r>
-              <a:rPr lang="en-US" smtClean="0"/>
+              <a:rPr lang="en-US"/>
               <a:t>Click to edit Master title style</a:t>
             </a:r>
-            <a:endParaRPr lang="en-US"/>
           </a:p>
         </p:txBody>
       </p:sp>
@@ -357,38 +363,37 @@
           <a:p>
             <a:pPr lvl="0"/>
             <a:r>
-              <a:rPr lang="en-US" smtClean="0"/>
+              <a:rPr lang="en-US"/>
               <a:t>Edit Master text styles</a:t>
             </a:r>
           </a:p>
           <a:p>
             <a:pPr lvl="1"/>
             <a:r>
-              <a:rPr lang="en-US" smtClean="0"/>
+              <a:rPr lang="en-US"/>
               <a:t>Second level</a:t>
             </a:r>
           </a:p>
           <a:p>
             <a:pPr lvl="2"/>
             <a:r>
-              <a:rPr lang="en-US" smtClean="0"/>
+              <a:rPr lang="en-US"/>
               <a:t>Third level</a:t>
             </a:r>
           </a:p>
           <a:p>
             <a:pPr lvl="3"/>
             <a:r>
-              <a:rPr lang="en-US" smtClean="0"/>
+              <a:rPr lang="en-US"/>
               <a:t>Fourth level</a:t>
             </a:r>
           </a:p>
           <a:p>
             <a:pPr lvl="4"/>
             <a:r>
-              <a:rPr lang="en-US" smtClean="0"/>
+              <a:rPr lang="en-US"/>
               <a:t>Fifth level</a:t>
             </a:r>
-            <a:endParaRPr lang="en-US"/>
           </a:p>
         </p:txBody>
       </p:sp>
@@ -409,7 +414,7 @@
           <a:p>
             <a:fld id="{A1B0DC63-3121-4D79-A9B3-098D8DDFF5F5}" type="datetimeFigureOut">
               <a:rPr lang="en-US" smtClean="0"/>
-              <a:t>10/29/2021</a:t>
+              <a:t>11/11/2021</a:t>
             </a:fld>
             <a:endParaRPr lang="en-US"/>
           </a:p>
@@ -508,10 +513,9 @@
           <a:lstStyle/>
           <a:p>
             <a:r>
-              <a:rPr lang="en-US" smtClean="0"/>
+              <a:rPr lang="en-US"/>
               <a:t>Click to edit Master title style</a:t>
             </a:r>
-            <a:endParaRPr lang="en-US"/>
           </a:p>
         </p:txBody>
       </p:sp>
@@ -537,38 +541,37 @@
           <a:p>
             <a:pPr lvl="0"/>
             <a:r>
-              <a:rPr lang="en-US" smtClean="0"/>
+              <a:rPr lang="en-US"/>
               <a:t>Edit Master text styles</a:t>
             </a:r>
           </a:p>
           <a:p>
             <a:pPr lvl="1"/>
             <a:r>
-              <a:rPr lang="en-US" smtClean="0"/>
+              <a:rPr lang="en-US"/>
               <a:t>Second level</a:t>
             </a:r>
           </a:p>
           <a:p>
             <a:pPr lvl="2"/>
             <a:r>
-              <a:rPr lang="en-US" smtClean="0"/>
+              <a:rPr lang="en-US"/>
               <a:t>Third level</a:t>
             </a:r>
           </a:p>
           <a:p>
             <a:pPr lvl="3"/>
             <a:r>
-              <a:rPr lang="en-US" smtClean="0"/>
+              <a:rPr lang="en-US"/>
               <a:t>Fourth level</a:t>
             </a:r>
           </a:p>
           <a:p>
             <a:pPr lvl="4"/>
             <a:r>
-              <a:rPr lang="en-US" smtClean="0"/>
+              <a:rPr lang="en-US"/>
               <a:t>Fifth level</a:t>
             </a:r>
-            <a:endParaRPr lang="en-US"/>
           </a:p>
         </p:txBody>
       </p:sp>
@@ -589,7 +592,7 @@
           <a:p>
             <a:fld id="{A1B0DC63-3121-4D79-A9B3-098D8DDFF5F5}" type="datetimeFigureOut">
               <a:rPr lang="en-US" smtClean="0"/>
-              <a:t>10/29/2021</a:t>
+              <a:t>11/11/2021</a:t>
             </a:fld>
             <a:endParaRPr lang="en-US"/>
           </a:p>
@@ -683,10 +686,9 @@
           <a:lstStyle/>
           <a:p>
             <a:r>
-              <a:rPr lang="en-US" smtClean="0"/>
+              <a:rPr lang="en-US"/>
               <a:t>Click to edit Master title style</a:t>
             </a:r>
-            <a:endParaRPr lang="en-US"/>
           </a:p>
         </p:txBody>
       </p:sp>
@@ -707,38 +709,37 @@
           <a:p>
             <a:pPr lvl="0"/>
             <a:r>
-              <a:rPr lang="en-US" smtClean="0"/>
+              <a:rPr lang="en-US"/>
               <a:t>Edit Master text styles</a:t>
             </a:r>
           </a:p>
           <a:p>
             <a:pPr lvl="1"/>
             <a:r>
-              <a:rPr lang="en-US" smtClean="0"/>
+              <a:rPr lang="en-US"/>
               <a:t>Second level</a:t>
             </a:r>
           </a:p>
           <a:p>
             <a:pPr lvl="2"/>
             <a:r>
-              <a:rPr lang="en-US" smtClean="0"/>
+              <a:rPr lang="en-US"/>
               <a:t>Third level</a:t>
             </a:r>
           </a:p>
           <a:p>
             <a:pPr lvl="3"/>
             <a:r>
-              <a:rPr lang="en-US" smtClean="0"/>
+              <a:rPr lang="en-US"/>
               <a:t>Fourth level</a:t>
             </a:r>
           </a:p>
           <a:p>
             <a:pPr lvl="4"/>
             <a:r>
-              <a:rPr lang="en-US" smtClean="0"/>
+              <a:rPr lang="en-US"/>
               <a:t>Fifth level</a:t>
             </a:r>
-            <a:endParaRPr lang="en-US"/>
           </a:p>
         </p:txBody>
       </p:sp>
@@ -759,7 +760,7 @@
           <a:p>
             <a:fld id="{A1B0DC63-3121-4D79-A9B3-098D8DDFF5F5}" type="datetimeFigureOut">
               <a:rPr lang="en-US" smtClean="0"/>
-              <a:t>10/29/2021</a:t>
+              <a:t>11/11/2021</a:t>
             </a:fld>
             <a:endParaRPr lang="en-US"/>
           </a:p>
@@ -862,10 +863,9 @@
           </a:lstStyle>
           <a:p>
             <a:r>
-              <a:rPr lang="en-US" smtClean="0"/>
+              <a:rPr lang="en-US"/>
               <a:t>Click to edit Master title style</a:t>
             </a:r>
-            <a:endParaRPr lang="en-US"/>
           </a:p>
         </p:txBody>
       </p:sp>
@@ -982,7 +982,7 @@
           <a:p>
             <a:pPr lvl="0"/>
             <a:r>
-              <a:rPr lang="en-US" smtClean="0"/>
+              <a:rPr lang="en-US"/>
               <a:t>Edit Master text styles</a:t>
             </a:r>
           </a:p>
@@ -1005,7 +1005,7 @@
           <a:p>
             <a:fld id="{A1B0DC63-3121-4D79-A9B3-098D8DDFF5F5}" type="datetimeFigureOut">
               <a:rPr lang="en-US" smtClean="0"/>
-              <a:t>10/29/2021</a:t>
+              <a:t>11/11/2021</a:t>
             </a:fld>
             <a:endParaRPr lang="en-US"/>
           </a:p>
@@ -1099,10 +1099,9 @@
           <a:lstStyle/>
           <a:p>
             <a:r>
-              <a:rPr lang="en-US" smtClean="0"/>
+              <a:rPr lang="en-US"/>
               <a:t>Click to edit Master title style</a:t>
             </a:r>
-            <a:endParaRPr lang="en-US"/>
           </a:p>
         </p:txBody>
       </p:sp>
@@ -1128,38 +1127,37 @@
           <a:p>
             <a:pPr lvl="0"/>
             <a:r>
-              <a:rPr lang="en-US" smtClean="0"/>
+              <a:rPr lang="en-US"/>
               <a:t>Edit Master text styles</a:t>
             </a:r>
           </a:p>
           <a:p>
             <a:pPr lvl="1"/>
             <a:r>
-              <a:rPr lang="en-US" smtClean="0"/>
+              <a:rPr lang="en-US"/>
               <a:t>Second level</a:t>
             </a:r>
           </a:p>
           <a:p>
             <a:pPr lvl="2"/>
             <a:r>
-              <a:rPr lang="en-US" smtClean="0"/>
+              <a:rPr lang="en-US"/>
               <a:t>Third level</a:t>
             </a:r>
           </a:p>
           <a:p>
             <a:pPr lvl="3"/>
             <a:r>
-              <a:rPr lang="en-US" smtClean="0"/>
+              <a:rPr lang="en-US"/>
               <a:t>Fourth level</a:t>
             </a:r>
           </a:p>
           <a:p>
             <a:pPr lvl="4"/>
             <a:r>
-              <a:rPr lang="en-US" smtClean="0"/>
+              <a:rPr lang="en-US"/>
               <a:t>Fifth level</a:t>
             </a:r>
-            <a:endParaRPr lang="en-US"/>
           </a:p>
         </p:txBody>
       </p:sp>
@@ -1185,38 +1183,37 @@
           <a:p>
             <a:pPr lvl="0"/>
             <a:r>
-              <a:rPr lang="en-US" smtClean="0"/>
+              <a:rPr lang="en-US"/>
               <a:t>Edit Master text styles</a:t>
             </a:r>
           </a:p>
           <a:p>
             <a:pPr lvl="1"/>
             <a:r>
-              <a:rPr lang="en-US" smtClean="0"/>
+              <a:rPr lang="en-US"/>
               <a:t>Second level</a:t>
             </a:r>
           </a:p>
           <a:p>
             <a:pPr lvl="2"/>
             <a:r>
-              <a:rPr lang="en-US" smtClean="0"/>
+              <a:rPr lang="en-US"/>
               <a:t>Third level</a:t>
             </a:r>
           </a:p>
           <a:p>
             <a:pPr lvl="3"/>
             <a:r>
-              <a:rPr lang="en-US" smtClean="0"/>
+              <a:rPr lang="en-US"/>
               <a:t>Fourth level</a:t>
             </a:r>
           </a:p>
           <a:p>
             <a:pPr lvl="4"/>
             <a:r>
-              <a:rPr lang="en-US" smtClean="0"/>
+              <a:rPr lang="en-US"/>
               <a:t>Fifth level</a:t>
             </a:r>
-            <a:endParaRPr lang="en-US"/>
           </a:p>
         </p:txBody>
       </p:sp>
@@ -1237,7 +1234,7 @@
           <a:p>
             <a:fld id="{A1B0DC63-3121-4D79-A9B3-098D8DDFF5F5}" type="datetimeFigureOut">
               <a:rPr lang="en-US" smtClean="0"/>
-              <a:t>10/29/2021</a:t>
+              <a:t>11/11/2021</a:t>
             </a:fld>
             <a:endParaRPr lang="en-US"/>
           </a:p>
@@ -1336,10 +1333,9 @@
           <a:lstStyle/>
           <a:p>
             <a:r>
-              <a:rPr lang="en-US" smtClean="0"/>
+              <a:rPr lang="en-US"/>
               <a:t>Click to edit Master title style</a:t>
             </a:r>
-            <a:endParaRPr lang="en-US"/>
           </a:p>
         </p:txBody>
       </p:sp>
@@ -1402,7 +1398,7 @@
           <a:p>
             <a:pPr lvl="0"/>
             <a:r>
-              <a:rPr lang="en-US" smtClean="0"/>
+              <a:rPr lang="en-US"/>
               <a:t>Edit Master text styles</a:t>
             </a:r>
           </a:p>
@@ -1430,38 +1426,37 @@
           <a:p>
             <a:pPr lvl="0"/>
             <a:r>
-              <a:rPr lang="en-US" smtClean="0"/>
+              <a:rPr lang="en-US"/>
               <a:t>Edit Master text styles</a:t>
             </a:r>
           </a:p>
           <a:p>
             <a:pPr lvl="1"/>
             <a:r>
-              <a:rPr lang="en-US" smtClean="0"/>
+              <a:rPr lang="en-US"/>
               <a:t>Second level</a:t>
             </a:r>
           </a:p>
           <a:p>
             <a:pPr lvl="2"/>
             <a:r>
-              <a:rPr lang="en-US" smtClean="0"/>
+              <a:rPr lang="en-US"/>
               <a:t>Third level</a:t>
             </a:r>
           </a:p>
           <a:p>
             <a:pPr lvl="3"/>
             <a:r>
-              <a:rPr lang="en-US" smtClean="0"/>
+              <a:rPr lang="en-US"/>
               <a:t>Fourth level</a:t>
             </a:r>
           </a:p>
           <a:p>
             <a:pPr lvl="4"/>
             <a:r>
-              <a:rPr lang="en-US" smtClean="0"/>
+              <a:rPr lang="en-US"/>
               <a:t>Fifth level</a:t>
             </a:r>
-            <a:endParaRPr lang="en-US"/>
           </a:p>
         </p:txBody>
       </p:sp>
@@ -1524,7 +1519,7 @@
           <a:p>
             <a:pPr lvl="0"/>
             <a:r>
-              <a:rPr lang="en-US" smtClean="0"/>
+              <a:rPr lang="en-US"/>
               <a:t>Edit Master text styles</a:t>
             </a:r>
           </a:p>
@@ -1552,38 +1547,37 @@
           <a:p>
             <a:pPr lvl="0"/>
             <a:r>
-              <a:rPr lang="en-US" smtClean="0"/>
+              <a:rPr lang="en-US"/>
               <a:t>Edit Master text styles</a:t>
             </a:r>
           </a:p>
           <a:p>
             <a:pPr lvl="1"/>
             <a:r>
-              <a:rPr lang="en-US" smtClean="0"/>
+              <a:rPr lang="en-US"/>
               <a:t>Second level</a:t>
             </a:r>
           </a:p>
           <a:p>
             <a:pPr lvl="2"/>
             <a:r>
-              <a:rPr lang="en-US" smtClean="0"/>
+              <a:rPr lang="en-US"/>
               <a:t>Third level</a:t>
             </a:r>
           </a:p>
           <a:p>
             <a:pPr lvl="3"/>
             <a:r>
-              <a:rPr lang="en-US" smtClean="0"/>
+              <a:rPr lang="en-US"/>
               <a:t>Fourth level</a:t>
             </a:r>
           </a:p>
           <a:p>
             <a:pPr lvl="4"/>
             <a:r>
-              <a:rPr lang="en-US" smtClean="0"/>
+              <a:rPr lang="en-US"/>
               <a:t>Fifth level</a:t>
             </a:r>
-            <a:endParaRPr lang="en-US"/>
           </a:p>
         </p:txBody>
       </p:sp>
@@ -1604,7 +1598,7 @@
           <a:p>
             <a:fld id="{A1B0DC63-3121-4D79-A9B3-098D8DDFF5F5}" type="datetimeFigureOut">
               <a:rPr lang="en-US" smtClean="0"/>
-              <a:t>10/29/2021</a:t>
+              <a:t>11/11/2021</a:t>
             </a:fld>
             <a:endParaRPr lang="en-US"/>
           </a:p>
@@ -1698,10 +1692,9 @@
           <a:lstStyle/>
           <a:p>
             <a:r>
-              <a:rPr lang="en-US" smtClean="0"/>
+              <a:rPr lang="en-US"/>
               <a:t>Click to edit Master title style</a:t>
             </a:r>
-            <a:endParaRPr lang="en-US"/>
           </a:p>
         </p:txBody>
       </p:sp>
@@ -1722,7 +1715,7 @@
           <a:p>
             <a:fld id="{A1B0DC63-3121-4D79-A9B3-098D8DDFF5F5}" type="datetimeFigureOut">
               <a:rPr lang="en-US" smtClean="0"/>
-              <a:t>10/29/2021</a:t>
+              <a:t>11/11/2021</a:t>
             </a:fld>
             <a:endParaRPr lang="en-US"/>
           </a:p>
@@ -1817,7 +1810,7 @@
           <a:p>
             <a:fld id="{A1B0DC63-3121-4D79-A9B3-098D8DDFF5F5}" type="datetimeFigureOut">
               <a:rPr lang="en-US" smtClean="0"/>
-              <a:t>10/29/2021</a:t>
+              <a:t>11/11/2021</a:t>
             </a:fld>
             <a:endParaRPr lang="en-US"/>
           </a:p>
@@ -1920,10 +1913,9 @@
           </a:lstStyle>
           <a:p>
             <a:r>
-              <a:rPr lang="en-US" smtClean="0"/>
+              <a:rPr lang="en-US"/>
               <a:t>Click to edit Master title style</a:t>
             </a:r>
-            <a:endParaRPr lang="en-US"/>
           </a:p>
         </p:txBody>
       </p:sp>
@@ -1977,38 +1969,37 @@
           <a:p>
             <a:pPr lvl="0"/>
             <a:r>
-              <a:rPr lang="en-US" smtClean="0"/>
+              <a:rPr lang="en-US"/>
               <a:t>Edit Master text styles</a:t>
             </a:r>
           </a:p>
           <a:p>
             <a:pPr lvl="1"/>
             <a:r>
-              <a:rPr lang="en-US" smtClean="0"/>
+              <a:rPr lang="en-US"/>
               <a:t>Second level</a:t>
             </a:r>
           </a:p>
           <a:p>
             <a:pPr lvl="2"/>
             <a:r>
-              <a:rPr lang="en-US" smtClean="0"/>
+              <a:rPr lang="en-US"/>
               <a:t>Third level</a:t>
             </a:r>
           </a:p>
           <a:p>
             <a:pPr lvl="3"/>
             <a:r>
-              <a:rPr lang="en-US" smtClean="0"/>
+              <a:rPr lang="en-US"/>
               <a:t>Fourth level</a:t>
             </a:r>
           </a:p>
           <a:p>
             <a:pPr lvl="4"/>
             <a:r>
-              <a:rPr lang="en-US" smtClean="0"/>
+              <a:rPr lang="en-US"/>
               <a:t>Fifth level</a:t>
             </a:r>
-            <a:endParaRPr lang="en-US"/>
           </a:p>
         </p:txBody>
       </p:sp>
@@ -2071,7 +2062,7 @@
           <a:p>
             <a:pPr lvl="0"/>
             <a:r>
-              <a:rPr lang="en-US" smtClean="0"/>
+              <a:rPr lang="en-US"/>
               <a:t>Edit Master text styles</a:t>
             </a:r>
           </a:p>
@@ -2094,7 +2085,7 @@
           <a:p>
             <a:fld id="{A1B0DC63-3121-4D79-A9B3-098D8DDFF5F5}" type="datetimeFigureOut">
               <a:rPr lang="en-US" smtClean="0"/>
-              <a:t>10/29/2021</a:t>
+              <a:t>11/11/2021</a:t>
             </a:fld>
             <a:endParaRPr lang="en-US"/>
           </a:p>
@@ -2197,10 +2188,9 @@
           </a:lstStyle>
           <a:p>
             <a:r>
-              <a:rPr lang="en-US" smtClean="0"/>
+              <a:rPr lang="en-US"/>
               <a:t>Click to edit Master title style</a:t>
             </a:r>
-            <a:endParaRPr lang="en-US"/>
           </a:p>
         </p:txBody>
       </p:sp>
@@ -2324,7 +2314,7 @@
           <a:p>
             <a:pPr lvl="0"/>
             <a:r>
-              <a:rPr lang="en-US" smtClean="0"/>
+              <a:rPr lang="en-US"/>
               <a:t>Edit Master text styles</a:t>
             </a:r>
           </a:p>
@@ -2347,7 +2337,7 @@
           <a:p>
             <a:fld id="{A1B0DC63-3121-4D79-A9B3-098D8DDFF5F5}" type="datetimeFigureOut">
               <a:rPr lang="en-US" smtClean="0"/>
-              <a:t>10/29/2021</a:t>
+              <a:t>11/11/2021</a:t>
             </a:fld>
             <a:endParaRPr lang="en-US"/>
           </a:p>
@@ -2456,10 +2446,9 @@
           <a:lstStyle/>
           <a:p>
             <a:r>
-              <a:rPr lang="en-US" smtClean="0"/>
+              <a:rPr lang="en-US"/>
               <a:t>Click to edit Master title style</a:t>
             </a:r>
-            <a:endParaRPr lang="en-US"/>
           </a:p>
         </p:txBody>
       </p:sp>
@@ -2490,38 +2479,37 @@
           <a:p>
             <a:pPr lvl="0"/>
             <a:r>
-              <a:rPr lang="en-US" smtClean="0"/>
+              <a:rPr lang="en-US"/>
               <a:t>Edit Master text styles</a:t>
             </a:r>
           </a:p>
           <a:p>
             <a:pPr lvl="1"/>
             <a:r>
-              <a:rPr lang="en-US" smtClean="0"/>
+              <a:rPr lang="en-US"/>
               <a:t>Second level</a:t>
             </a:r>
           </a:p>
           <a:p>
             <a:pPr lvl="2"/>
             <a:r>
-              <a:rPr lang="en-US" smtClean="0"/>
+              <a:rPr lang="en-US"/>
               <a:t>Third level</a:t>
             </a:r>
           </a:p>
           <a:p>
             <a:pPr lvl="3"/>
             <a:r>
-              <a:rPr lang="en-US" smtClean="0"/>
+              <a:rPr lang="en-US"/>
               <a:t>Fourth level</a:t>
             </a:r>
           </a:p>
           <a:p>
             <a:pPr lvl="4"/>
             <a:r>
-              <a:rPr lang="en-US" smtClean="0"/>
+              <a:rPr lang="en-US"/>
               <a:t>Fifth level</a:t>
             </a:r>
-            <a:endParaRPr lang="en-US"/>
           </a:p>
         </p:txBody>
       </p:sp>
@@ -2560,7 +2548,7 @@
           <a:p>
             <a:fld id="{A1B0DC63-3121-4D79-A9B3-098D8DDFF5F5}" type="datetimeFigureOut">
               <a:rPr lang="en-US" smtClean="0"/>
-              <a:t>10/29/2021</a:t>
+              <a:t>11/11/2021</a:t>
             </a:fld>
             <a:endParaRPr lang="en-US"/>
           </a:p>
@@ -2977,1069 +2965,300 @@
         </p:nvSpPr>
         <p:spPr>
           <a:xfrm>
-            <a:off x="838200" y="92937"/>
+            <a:off x="798842" y="132705"/>
             <a:ext cx="10515600" cy="1325563"/>
           </a:xfrm>
         </p:spPr>
         <p:txBody>
-          <a:bodyPr>
-            <a:normAutofit/>
+          <a:bodyPr/>
+          <a:lstStyle/>
+          <a:p>
+            <a:pPr algn="ctr"/>
+            <a:r>
+              <a:rPr lang="en-US" dirty="0"/>
+              <a:t>Hardware and software of the system</a:t>
+            </a:r>
+          </a:p>
+        </p:txBody>
+      </p:sp>
+      <p:pic>
+        <p:nvPicPr>
+          <p:cNvPr id="4" name="Content Placeholder 3"/>
+          <p:cNvPicPr>
+            <a:picLocks noGrp="1" noChangeAspect="1"/>
+          </p:cNvPicPr>
+          <p:nvPr>
+            <p:ph idx="1"/>
+          </p:nvPr>
+        </p:nvPicPr>
+        <p:blipFill>
+          <a:blip r:embed="rId2" cstate="print">
+            <a:extLst>
+              <a:ext uri="{28A0092B-C50C-407E-A947-70E740481C1C}">
+                <a14:useLocalDpi xmlns:a14="http://schemas.microsoft.com/office/drawing/2010/main" val="0"/>
+              </a:ext>
+            </a:extLst>
+          </a:blip>
+          <a:stretch>
+            <a:fillRect/>
+          </a:stretch>
+        </p:blipFill>
+        <p:spPr>
+          <a:xfrm>
+            <a:off x="3579308" y="1458268"/>
+            <a:ext cx="5225058" cy="5328295"/>
+          </a:xfrm>
+        </p:spPr>
+      </p:pic>
+      <p:sp>
+        <p:nvSpPr>
+          <p:cNvPr id="5" name="TextBox 4"/>
+          <p:cNvSpPr txBox="1"/>
+          <p:nvPr/>
+        </p:nvSpPr>
+        <p:spPr>
+          <a:xfrm>
+            <a:off x="7100667" y="3444240"/>
+            <a:ext cx="1319348" cy="369332"/>
+          </a:xfrm>
+          <a:prstGeom prst="rect">
+            <a:avLst/>
+          </a:prstGeom>
+          <a:solidFill>
+            <a:schemeClr val="bg1"/>
+          </a:solidFill>
+          <a:ln>
+            <a:solidFill>
+              <a:schemeClr val="bg1"/>
+            </a:solidFill>
+          </a:ln>
+        </p:spPr>
+        <p:txBody>
+          <a:bodyPr wrap="square" rtlCol="1">
+            <a:spAutoFit/>
           </a:bodyPr>
           <a:lstStyle/>
           <a:p>
-            <a:pPr algn="ctr"/>
-            <a:r>
-              <a:rPr lang="en-US" sz="3600" dirty="0" smtClean="0"/>
-              <a:t>Bypassing obstacles on S.W. – algorithm modules </a:t>
-            </a:r>
-            <a:endParaRPr lang="en-US" sz="3600" dirty="0"/>
-          </a:p>
-        </p:txBody>
-      </p:sp>
-      <p:graphicFrame>
-        <p:nvGraphicFramePr>
-          <p:cNvPr id="4" name="Content Placeholder 3"/>
-          <p:cNvGraphicFramePr>
-            <a:graphicFrameLocks noGrp="1"/>
-          </p:cNvGraphicFramePr>
-          <p:nvPr>
-            <p:ph idx="1"/>
-            <p:extLst>
-              <p:ext uri="{D42A27DB-BD31-4B8C-83A1-F6EECF244321}">
-                <p14:modId xmlns:p14="http://schemas.microsoft.com/office/powerpoint/2010/main" val="2927161158"/>
-              </p:ext>
-            </p:extLst>
-          </p:nvPr>
-        </p:nvGraphicFramePr>
-        <p:xfrm>
-          <a:off x="838200" y="1235620"/>
-          <a:ext cx="10515603" cy="5394960"/>
-        </p:xfrm>
-        <a:graphic>
-          <a:graphicData uri="http://schemas.openxmlformats.org/drawingml/2006/table">
-            <a:tbl>
-              <a:tblPr rtl="1" firstRow="1" bandRow="1">
-                <a:tableStyleId>{5C22544A-7EE6-4342-B048-85BDC9FD1C3A}</a:tableStyleId>
-              </a:tblPr>
-              <a:tblGrid>
-                <a:gridCol w="1025434">
-                  <a:extLst>
-                    <a:ext uri="{9D8B030D-6E8A-4147-A177-3AD203B41FA5}">
-                      <a16:colId xmlns:a16="http://schemas.microsoft.com/office/drawing/2014/main" val="3584997908"/>
-                    </a:ext>
-                  </a:extLst>
-                </a:gridCol>
-                <a:gridCol w="2168435">
-                  <a:extLst>
-                    <a:ext uri="{9D8B030D-6E8A-4147-A177-3AD203B41FA5}">
-                      <a16:colId xmlns:a16="http://schemas.microsoft.com/office/drawing/2014/main" val="985795155"/>
-                    </a:ext>
-                  </a:extLst>
-                </a:gridCol>
-                <a:gridCol w="1062445">
-                  <a:extLst>
-                    <a:ext uri="{9D8B030D-6E8A-4147-A177-3AD203B41FA5}">
-                      <a16:colId xmlns:a16="http://schemas.microsoft.com/office/drawing/2014/main" val="961473022"/>
-                    </a:ext>
-                  </a:extLst>
-                </a:gridCol>
-                <a:gridCol w="1534886">
-                  <a:extLst>
-                    <a:ext uri="{9D8B030D-6E8A-4147-A177-3AD203B41FA5}">
-                      <a16:colId xmlns:a16="http://schemas.microsoft.com/office/drawing/2014/main" val="871209325"/>
-                    </a:ext>
-                  </a:extLst>
-                </a:gridCol>
-                <a:gridCol w="1719945">
-                  <a:extLst>
-                    <a:ext uri="{9D8B030D-6E8A-4147-A177-3AD203B41FA5}">
-                      <a16:colId xmlns:a16="http://schemas.microsoft.com/office/drawing/2014/main" val="1724374475"/>
-                    </a:ext>
-                  </a:extLst>
-                </a:gridCol>
-                <a:gridCol w="1687284">
-                  <a:extLst>
-                    <a:ext uri="{9D8B030D-6E8A-4147-A177-3AD203B41FA5}">
-                      <a16:colId xmlns:a16="http://schemas.microsoft.com/office/drawing/2014/main" val="667892965"/>
-                    </a:ext>
-                  </a:extLst>
-                </a:gridCol>
-                <a:gridCol w="1317174">
-                  <a:extLst>
-                    <a:ext uri="{9D8B030D-6E8A-4147-A177-3AD203B41FA5}">
-                      <a16:colId xmlns:a16="http://schemas.microsoft.com/office/drawing/2014/main" val="3727366086"/>
-                    </a:ext>
-                  </a:extLst>
-                </a:gridCol>
-              </a:tblGrid>
-              <a:tr h="370840">
-                <a:tc>
-                  <a:txBody>
-                    <a:bodyPr/>
-                    <a:lstStyle/>
-                    <a:p>
-                      <a:r>
-                        <a:rPr lang="en-US" sz="1300" dirty="0" smtClean="0"/>
-                        <a:t>Run-time </a:t>
-                      </a:r>
-                      <a:endParaRPr lang="en-US" sz="1300" dirty="0"/>
-                    </a:p>
-                  </a:txBody>
-                  <a:tcPr/>
-                </a:tc>
-                <a:tc>
-                  <a:txBody>
-                    <a:bodyPr/>
-                    <a:lstStyle/>
-                    <a:p>
-                      <a:r>
-                        <a:rPr lang="en-US" sz="1300" dirty="0" smtClean="0"/>
-                        <a:t>Performance test </a:t>
-                      </a:r>
-                      <a:endParaRPr lang="en-US" sz="1300" dirty="0"/>
-                    </a:p>
-                  </a:txBody>
-                  <a:tcPr/>
-                </a:tc>
-                <a:tc>
-                  <a:txBody>
-                    <a:bodyPr/>
-                    <a:lstStyle/>
-                    <a:p>
-                      <a:r>
-                        <a:rPr lang="en-US" sz="1300" dirty="0" smtClean="0"/>
-                        <a:t>Output module </a:t>
-                      </a:r>
-                      <a:endParaRPr lang="en-US" sz="1300" dirty="0"/>
-                    </a:p>
-                  </a:txBody>
-                  <a:tcPr/>
-                </a:tc>
-                <a:tc>
-                  <a:txBody>
-                    <a:bodyPr/>
-                    <a:lstStyle/>
-                    <a:p>
-                      <a:r>
-                        <a:rPr lang="en-US" sz="1300" dirty="0" smtClean="0"/>
-                        <a:t>Output </a:t>
-                      </a:r>
-                      <a:endParaRPr lang="en-US" sz="1300" dirty="0"/>
-                    </a:p>
-                  </a:txBody>
-                  <a:tcPr/>
-                </a:tc>
-                <a:tc>
-                  <a:txBody>
-                    <a:bodyPr/>
-                    <a:lstStyle/>
-                    <a:p>
-                      <a:r>
-                        <a:rPr lang="en-US" sz="1300" dirty="0" smtClean="0"/>
-                        <a:t>Input </a:t>
-                      </a:r>
-                      <a:endParaRPr lang="en-US" sz="1300" dirty="0"/>
-                    </a:p>
-                  </a:txBody>
-                  <a:tcPr/>
-                </a:tc>
-                <a:tc>
-                  <a:txBody>
-                    <a:bodyPr/>
-                    <a:lstStyle/>
-                    <a:p>
-                      <a:r>
-                        <a:rPr lang="en-US" sz="1300" dirty="0" smtClean="0"/>
-                        <a:t>Input module</a:t>
-                      </a:r>
-                      <a:endParaRPr lang="en-US" sz="1300" dirty="0"/>
-                    </a:p>
-                  </a:txBody>
-                  <a:tcPr/>
-                </a:tc>
-                <a:tc>
-                  <a:txBody>
-                    <a:bodyPr/>
-                    <a:lstStyle/>
-                    <a:p>
-                      <a:r>
-                        <a:rPr lang="en-US" sz="1300" dirty="0" smtClean="0"/>
-                        <a:t>Module</a:t>
-                      </a:r>
-                      <a:r>
-                        <a:rPr lang="en-US" sz="1300" baseline="0" dirty="0" smtClean="0"/>
-                        <a:t> name</a:t>
-                      </a:r>
-                      <a:endParaRPr lang="en-US" sz="1300" dirty="0"/>
-                    </a:p>
-                  </a:txBody>
-                  <a:tcPr/>
-                </a:tc>
-                <a:extLst>
-                  <a:ext uri="{0D108BD9-81ED-4DB2-BD59-A6C34878D82A}">
-                    <a16:rowId xmlns:a16="http://schemas.microsoft.com/office/drawing/2014/main" val="278899944"/>
-                  </a:ext>
-                </a:extLst>
-              </a:tr>
-              <a:tr h="370840">
-                <a:tc>
-                  <a:txBody>
-                    <a:bodyPr/>
-                    <a:lstStyle/>
-                    <a:p>
-                      <a:r>
-                        <a:rPr lang="en-US" sz="1300" dirty="0" err="1" smtClean="0"/>
-                        <a:t>Matlab</a:t>
-                      </a:r>
-                      <a:r>
-                        <a:rPr lang="en-US" sz="1300" dirty="0" smtClean="0"/>
-                        <a:t>:</a:t>
-                      </a:r>
-                    </a:p>
-                    <a:p>
-                      <a:r>
-                        <a:rPr lang="en-US" sz="1300" dirty="0" smtClean="0"/>
-                        <a:t>Python:  </a:t>
-                      </a:r>
-                      <a:endParaRPr lang="en-US" sz="1300" dirty="0"/>
-                    </a:p>
-                  </a:txBody>
-                  <a:tcPr/>
-                </a:tc>
-                <a:tc>
-                  <a:txBody>
-                    <a:bodyPr/>
-                    <a:lstStyle/>
-                    <a:p>
-                      <a:r>
-                        <a:rPr lang="en-US" sz="1300" dirty="0" smtClean="0"/>
-                        <a:t>Walk for 50m and set stride </a:t>
-                      </a:r>
-                      <a:r>
-                        <a:rPr lang="en-US" sz="1300" dirty="0" smtClean="0"/>
-                        <a:t>parameters </a:t>
-                      </a:r>
-                      <a:r>
-                        <a:rPr lang="en-US" sz="1300" dirty="0" smtClean="0"/>
-                        <a:t>K1&amp;k2 such</a:t>
-                      </a:r>
-                      <a:r>
-                        <a:rPr lang="en-US" sz="1300" baseline="0" dirty="0" smtClean="0"/>
-                        <a:t> that the</a:t>
-                      </a:r>
-                      <a:r>
-                        <a:rPr lang="en-US" sz="1300" dirty="0" smtClean="0"/>
-                        <a:t> cumulative strides length is 50m</a:t>
-                      </a:r>
-                      <a:endParaRPr lang="en-US" sz="1300" dirty="0"/>
-                    </a:p>
-                  </a:txBody>
-                  <a:tcPr/>
-                </a:tc>
-                <a:tc>
-                  <a:txBody>
-                    <a:bodyPr/>
-                    <a:lstStyle/>
-                    <a:p>
-                      <a:r>
-                        <a:rPr lang="en-US" sz="1300" dirty="0" smtClean="0"/>
-                        <a:t>Scan matching</a:t>
-                      </a:r>
-                      <a:endParaRPr lang="en-US" sz="1300" dirty="0"/>
-                    </a:p>
-                  </a:txBody>
-                  <a:tcPr/>
-                </a:tc>
-                <a:tc>
-                  <a:txBody>
-                    <a:bodyPr/>
-                    <a:lstStyle/>
-                    <a:p>
-                      <a:r>
-                        <a:rPr lang="en-US" sz="1300" dirty="0" smtClean="0"/>
-                        <a:t>IMU X-Y</a:t>
-                      </a:r>
-                      <a:r>
-                        <a:rPr lang="en-US" sz="1300" baseline="0" dirty="0" smtClean="0"/>
-                        <a:t> translations at 6Hz</a:t>
-                      </a:r>
-                      <a:endParaRPr lang="en-US" sz="1300" dirty="0"/>
-                    </a:p>
-                  </a:txBody>
-                  <a:tcPr/>
-                </a:tc>
-                <a:tc>
-                  <a:txBody>
-                    <a:bodyPr/>
-                    <a:lstStyle/>
-                    <a:p>
-                      <a:r>
-                        <a:rPr lang="en-US" sz="1300" dirty="0" smtClean="0"/>
-                        <a:t>IMU acceleration raw data at 200Hz</a:t>
-                      </a:r>
-                      <a:endParaRPr lang="en-US" sz="1300" dirty="0"/>
-                    </a:p>
-                  </a:txBody>
-                  <a:tcPr/>
-                </a:tc>
-                <a:tc>
-                  <a:txBody>
-                    <a:bodyPr/>
-                    <a:lstStyle/>
-                    <a:p>
-                      <a:r>
-                        <a:rPr lang="en-US" sz="1300" dirty="0" smtClean="0"/>
-                        <a:t>RealSense, IMU, accelerometer, </a:t>
-                      </a:r>
-                      <a:endParaRPr lang="en-US" sz="1300" dirty="0"/>
-                    </a:p>
-                  </a:txBody>
-                  <a:tcPr/>
-                </a:tc>
-                <a:tc>
-                  <a:txBody>
-                    <a:bodyPr/>
-                    <a:lstStyle/>
-                    <a:p>
-                      <a:r>
-                        <a:rPr lang="en-US" sz="1300" dirty="0" smtClean="0"/>
-                        <a:t>Translation</a:t>
-                      </a:r>
-                      <a:r>
-                        <a:rPr lang="en-US" sz="1300" baseline="0" dirty="0" smtClean="0"/>
-                        <a:t> filter</a:t>
-                      </a:r>
-                      <a:endParaRPr lang="en-US" sz="1300" dirty="0"/>
-                    </a:p>
-                  </a:txBody>
-                  <a:tcPr/>
-                </a:tc>
-                <a:extLst>
-                  <a:ext uri="{0D108BD9-81ED-4DB2-BD59-A6C34878D82A}">
-                    <a16:rowId xmlns:a16="http://schemas.microsoft.com/office/drawing/2014/main" val="3204104519"/>
-                  </a:ext>
-                </a:extLst>
-              </a:tr>
-              <a:tr h="370840">
-                <a:tc>
-                  <a:txBody>
-                    <a:bodyPr/>
-                    <a:lstStyle/>
-                    <a:p>
-                      <a:endParaRPr lang="en-US" sz="1300" dirty="0"/>
-                    </a:p>
-                  </a:txBody>
-                  <a:tcPr/>
-                </a:tc>
-                <a:tc>
-                  <a:txBody>
-                    <a:bodyPr/>
-                    <a:lstStyle/>
-                    <a:p>
-                      <a:r>
-                        <a:rPr lang="en-US" sz="1300" dirty="0" smtClean="0"/>
-                        <a:t>Compare STD of P.C.</a:t>
-                      </a:r>
-                      <a:r>
-                        <a:rPr lang="en-US" sz="1300" baseline="0" dirty="0" smtClean="0"/>
-                        <a:t> in z-axis </a:t>
-                      </a:r>
-                      <a:r>
-                        <a:rPr lang="en-US" sz="1300" dirty="0" smtClean="0"/>
-                        <a:t>inside a bounding box around the center of the plane to a bounding frame surrounding this box</a:t>
-                      </a:r>
-                      <a:endParaRPr lang="en-US" sz="1300" dirty="0"/>
-                    </a:p>
-                  </a:txBody>
-                  <a:tcPr/>
-                </a:tc>
-                <a:tc>
-                  <a:txBody>
-                    <a:bodyPr/>
-                    <a:lstStyle/>
-                    <a:p>
-                      <a:r>
-                        <a:rPr lang="en-US" sz="1300" dirty="0" smtClean="0"/>
-                        <a:t>Scan matching</a:t>
-                      </a:r>
-                      <a:endParaRPr lang="en-US" sz="1300" dirty="0"/>
-                    </a:p>
-                  </a:txBody>
-                  <a:tcPr/>
-                </a:tc>
-                <a:tc>
-                  <a:txBody>
-                    <a:bodyPr/>
-                    <a:lstStyle/>
-                    <a:p>
-                      <a:r>
-                        <a:rPr lang="en-US" sz="1300" dirty="0" smtClean="0"/>
-                        <a:t>Rotated</a:t>
-                      </a:r>
-                      <a:r>
-                        <a:rPr lang="en-US" sz="1300" baseline="0" dirty="0" smtClean="0"/>
-                        <a:t> P.C. frame</a:t>
-                      </a:r>
-                      <a:endParaRPr lang="en-US" sz="1300" dirty="0"/>
-                    </a:p>
-                  </a:txBody>
-                  <a:tcPr/>
-                </a:tc>
-                <a:tc>
-                  <a:txBody>
-                    <a:bodyPr/>
-                    <a:lstStyle/>
-                    <a:p>
-                      <a:r>
-                        <a:rPr lang="en-US" sz="1300" dirty="0" smtClean="0"/>
-                        <a:t>P.C. ; </a:t>
-                      </a:r>
-                      <a:r>
-                        <a:rPr lang="en-US" sz="1300" dirty="0" err="1" smtClean="0"/>
-                        <a:t>euler</a:t>
-                      </a:r>
-                      <a:r>
-                        <a:rPr lang="en-US" sz="1300" dirty="0" smtClean="0"/>
-                        <a:t> angles (</a:t>
-                      </a:r>
-                      <a:r>
-                        <a:rPr lang="en-US" sz="1300" dirty="0" err="1" smtClean="0"/>
-                        <a:t>madgwick</a:t>
-                      </a:r>
-                      <a:r>
-                        <a:rPr lang="en-US" sz="1300" dirty="0" smtClean="0"/>
-                        <a:t> filter)</a:t>
-                      </a:r>
-                      <a:endParaRPr lang="en-US" sz="1300" dirty="0"/>
-                    </a:p>
-                  </a:txBody>
-                  <a:tcPr/>
-                </a:tc>
-                <a:tc>
-                  <a:txBody>
-                    <a:bodyPr/>
-                    <a:lstStyle/>
-                    <a:p>
-                      <a:pPr marL="342900" indent="-342900">
-                        <a:buAutoNum type="arabicPeriod"/>
-                      </a:pPr>
-                      <a:r>
-                        <a:rPr lang="en-US" sz="1300" dirty="0" smtClean="0"/>
-                        <a:t>RealSense, P.C.</a:t>
-                      </a:r>
-                    </a:p>
-                    <a:p>
-                      <a:pPr marL="342900" marR="0" indent="-342900" algn="l" defTabSz="914400" rtl="0" eaLnBrk="1" fontAlgn="auto" latinLnBrk="0" hangingPunct="1">
-                        <a:lnSpc>
-                          <a:spcPct val="100000"/>
-                        </a:lnSpc>
-                        <a:spcBef>
-                          <a:spcPts val="0"/>
-                        </a:spcBef>
-                        <a:spcAft>
-                          <a:spcPts val="0"/>
-                        </a:spcAft>
-                        <a:buClrTx/>
-                        <a:buSzTx/>
-                        <a:buFontTx/>
-                        <a:buAutoNum type="arabicPeriod"/>
-                        <a:tabLst/>
-                        <a:defRPr/>
-                      </a:pPr>
-                      <a:r>
-                        <a:rPr lang="en-US" sz="1300" dirty="0" smtClean="0"/>
-                        <a:t>Euler angles pitch and roll (IMU) </a:t>
-                      </a:r>
-                      <a:endParaRPr lang="en-US" sz="1300" dirty="0"/>
-                    </a:p>
-                  </a:txBody>
-                  <a:tcPr/>
-                </a:tc>
-                <a:tc>
-                  <a:txBody>
-                    <a:bodyPr/>
-                    <a:lstStyle/>
-                    <a:p>
-                      <a:r>
-                        <a:rPr lang="en-US" sz="1300" dirty="0" smtClean="0"/>
-                        <a:t>P.C. Plane fit </a:t>
-                      </a:r>
-                      <a:endParaRPr lang="en-US" sz="1300" dirty="0"/>
-                    </a:p>
-                  </a:txBody>
-                  <a:tcPr/>
-                </a:tc>
-                <a:extLst>
-                  <a:ext uri="{0D108BD9-81ED-4DB2-BD59-A6C34878D82A}">
-                    <a16:rowId xmlns:a16="http://schemas.microsoft.com/office/drawing/2014/main" val="3969501889"/>
-                  </a:ext>
-                </a:extLst>
-              </a:tr>
-              <a:tr h="370840">
-                <a:tc>
-                  <a:txBody>
-                    <a:bodyPr/>
-                    <a:lstStyle/>
-                    <a:p>
-                      <a:endParaRPr lang="en-US" sz="1300"/>
-                    </a:p>
-                  </a:txBody>
-                  <a:tcPr/>
-                </a:tc>
-                <a:tc>
-                  <a:txBody>
-                    <a:bodyPr/>
-                    <a:lstStyle/>
-                    <a:p>
-                      <a:r>
-                        <a:rPr lang="en-US" sz="1300" dirty="0" smtClean="0"/>
-                        <a:t>Compare translation based on IMU with translation based on scan</a:t>
-                      </a:r>
-                      <a:r>
-                        <a:rPr lang="en-US" sz="1300" baseline="0" dirty="0" smtClean="0"/>
-                        <a:t> matching, compare yaw angle to derived yaw angle,</a:t>
-                      </a:r>
-                      <a:endParaRPr lang="en-US" sz="1300" dirty="0"/>
-                    </a:p>
-                  </a:txBody>
-                  <a:tcPr/>
-                </a:tc>
-                <a:tc>
-                  <a:txBody>
-                    <a:bodyPr/>
-                    <a:lstStyle/>
-                    <a:p>
-                      <a:r>
-                        <a:rPr lang="en-US" sz="1300" dirty="0" smtClean="0"/>
-                        <a:t>SLAM</a:t>
-                      </a:r>
-                      <a:endParaRPr lang="en-US" sz="1300" dirty="0"/>
-                    </a:p>
-                  </a:txBody>
-                  <a:tcPr/>
-                </a:tc>
-                <a:tc>
-                  <a:txBody>
-                    <a:bodyPr/>
-                    <a:lstStyle/>
-                    <a:p>
-                      <a:r>
-                        <a:rPr lang="en-US" sz="1300" dirty="0" smtClean="0"/>
-                        <a:t>Frame </a:t>
-                      </a:r>
-                      <a:r>
-                        <a:rPr lang="en-US" sz="1300" dirty="0" smtClean="0"/>
-                        <a:t>(</a:t>
-                      </a:r>
-                      <a:r>
-                        <a:rPr lang="en-US" sz="1300" dirty="0" err="1" smtClean="0"/>
-                        <a:t>i</a:t>
-                      </a:r>
-                      <a:r>
-                        <a:rPr lang="en-US" sz="1300" dirty="0" smtClean="0"/>
-                        <a:t> </a:t>
-                      </a:r>
-                      <a:r>
-                        <a:rPr lang="en-US" sz="1300" dirty="0" smtClean="0"/>
-                        <a:t>to i+1)</a:t>
-                      </a:r>
-                      <a:r>
-                        <a:rPr lang="en-US" sz="1300" baseline="0" dirty="0" smtClean="0"/>
-                        <a:t> </a:t>
-                      </a:r>
-                      <a:r>
-                        <a:rPr lang="en-US" sz="1300" dirty="0" smtClean="0"/>
-                        <a:t>translation</a:t>
-                      </a:r>
-                      <a:r>
-                        <a:rPr lang="en-US" sz="1300" baseline="0" dirty="0" smtClean="0"/>
-                        <a:t> and </a:t>
-                      </a:r>
-                      <a:r>
-                        <a:rPr lang="en-US" sz="1300" baseline="0" dirty="0" smtClean="0"/>
-                        <a:t>yaw</a:t>
-                      </a:r>
-                      <a:r>
-                        <a:rPr lang="en-US" sz="1300" dirty="0" smtClean="0"/>
-                        <a:t>;</a:t>
-                      </a:r>
-                      <a:r>
-                        <a:rPr lang="en-US" sz="1300" baseline="0" dirty="0" smtClean="0"/>
-                        <a:t>  d-frame top view,</a:t>
-                      </a:r>
-                      <a:endParaRPr lang="en-US" sz="1300" dirty="0"/>
-                    </a:p>
-                  </a:txBody>
-                  <a:tcPr/>
-                </a:tc>
-                <a:tc>
-                  <a:txBody>
-                    <a:bodyPr/>
-                    <a:lstStyle/>
-                    <a:p>
-                      <a:pPr marL="0" marR="0" indent="0" algn="l" defTabSz="914400" rtl="0" eaLnBrk="1" fontAlgn="auto" latinLnBrk="0" hangingPunct="1">
-                        <a:lnSpc>
-                          <a:spcPct val="100000"/>
-                        </a:lnSpc>
-                        <a:spcBef>
-                          <a:spcPts val="0"/>
-                        </a:spcBef>
-                        <a:spcAft>
-                          <a:spcPts val="0"/>
-                        </a:spcAft>
-                        <a:buClrTx/>
-                        <a:buSzTx/>
-                        <a:buFontTx/>
-                        <a:buNone/>
-                        <a:tabLst/>
-                        <a:defRPr/>
-                      </a:pPr>
-                      <a:r>
-                        <a:rPr lang="en-US" sz="1300" dirty="0" smtClean="0"/>
-                        <a:t>Rotated</a:t>
-                      </a:r>
-                      <a:r>
-                        <a:rPr lang="en-US" sz="1300" baseline="0" dirty="0" smtClean="0"/>
-                        <a:t> P.C. frames (i-1 and </a:t>
-                      </a:r>
-                      <a:r>
-                        <a:rPr lang="en-US" sz="1300" baseline="0" dirty="0" err="1" smtClean="0"/>
-                        <a:t>i</a:t>
-                      </a:r>
-                      <a:r>
-                        <a:rPr lang="en-US" sz="1300" baseline="0" dirty="0" smtClean="0"/>
-                        <a:t>); frame (i-1 to </a:t>
-                      </a:r>
-                      <a:r>
-                        <a:rPr lang="en-US" sz="1300" baseline="0" dirty="0" err="1" smtClean="0"/>
-                        <a:t>i</a:t>
-                      </a:r>
-                      <a:r>
-                        <a:rPr lang="en-US" sz="1300" baseline="0" dirty="0" smtClean="0"/>
-                        <a:t>) </a:t>
-                      </a:r>
-                      <a:r>
-                        <a:rPr lang="en-US" sz="1300" baseline="0" dirty="0" smtClean="0"/>
-                        <a:t>translation</a:t>
-                      </a:r>
-                      <a:r>
-                        <a:rPr lang="en-US" sz="1300" baseline="0" dirty="0" smtClean="0"/>
-                        <a:t>; </a:t>
-                      </a:r>
-                      <a:r>
-                        <a:rPr lang="en-US" sz="1300" baseline="0" dirty="0" smtClean="0"/>
-                        <a:t>Yaw and  </a:t>
-                      </a:r>
-                      <a:r>
-                        <a:rPr lang="en-US" sz="1300" baseline="0" dirty="0" smtClean="0"/>
-                        <a:t>texture; </a:t>
-                      </a:r>
-                      <a:endParaRPr lang="en-US" sz="1300" dirty="0" smtClean="0"/>
-                    </a:p>
-                  </a:txBody>
-                  <a:tcPr/>
-                </a:tc>
-                <a:tc>
-                  <a:txBody>
-                    <a:bodyPr/>
-                    <a:lstStyle/>
-                    <a:p>
-                      <a:pPr marL="0" marR="0" indent="0" algn="l" defTabSz="914400" rtl="0" eaLnBrk="1" fontAlgn="auto" latinLnBrk="0" hangingPunct="1">
-                        <a:lnSpc>
-                          <a:spcPct val="100000"/>
-                        </a:lnSpc>
-                        <a:spcBef>
-                          <a:spcPts val="0"/>
-                        </a:spcBef>
-                        <a:spcAft>
-                          <a:spcPts val="0"/>
-                        </a:spcAft>
-                        <a:buClrTx/>
-                        <a:buSzTx/>
-                        <a:buFontTx/>
-                        <a:buNone/>
-                        <a:tabLst/>
-                        <a:defRPr/>
-                      </a:pPr>
-                      <a:r>
-                        <a:rPr lang="en-US" sz="1300" dirty="0" smtClean="0"/>
-                        <a:t>1. </a:t>
-                      </a:r>
-                      <a:r>
-                        <a:rPr lang="en-US" sz="1300" dirty="0" smtClean="0"/>
-                        <a:t>P.C. Plane fit </a:t>
-                      </a:r>
-                    </a:p>
-                    <a:p>
-                      <a:r>
-                        <a:rPr lang="en-US" sz="1300" dirty="0" smtClean="0"/>
-                        <a:t>2. RealSense texture</a:t>
-                      </a:r>
-                    </a:p>
-                    <a:p>
-                      <a:r>
-                        <a:rPr lang="en-US" sz="1300" dirty="0" smtClean="0"/>
-                        <a:t>3. IMU</a:t>
-                      </a:r>
-                      <a:r>
-                        <a:rPr lang="en-US" sz="1300" baseline="0" dirty="0" smtClean="0"/>
-                        <a:t> yaw</a:t>
-                      </a:r>
-                    </a:p>
-                    <a:p>
-                      <a:r>
-                        <a:rPr lang="en-US" sz="1300" baseline="0" dirty="0" smtClean="0"/>
-                        <a:t>4. Translation filter</a:t>
-                      </a:r>
-                      <a:endParaRPr lang="en-US" sz="1300" dirty="0"/>
-                    </a:p>
-                  </a:txBody>
-                  <a:tcPr/>
-                </a:tc>
-                <a:tc>
-                  <a:txBody>
-                    <a:bodyPr/>
-                    <a:lstStyle/>
-                    <a:p>
-                      <a:r>
-                        <a:rPr lang="en-US" sz="1300" dirty="0" smtClean="0"/>
-                        <a:t>Scan matching</a:t>
-                      </a:r>
-                      <a:endParaRPr lang="en-US" sz="1300" dirty="0"/>
-                    </a:p>
-                  </a:txBody>
-                  <a:tcPr/>
-                </a:tc>
-                <a:extLst>
-                  <a:ext uri="{0D108BD9-81ED-4DB2-BD59-A6C34878D82A}">
-                    <a16:rowId xmlns:a16="http://schemas.microsoft.com/office/drawing/2014/main" val="1616977776"/>
-                  </a:ext>
-                </a:extLst>
-              </a:tr>
-              <a:tr h="370840">
-                <a:tc>
-                  <a:txBody>
-                    <a:bodyPr/>
-                    <a:lstStyle/>
-                    <a:p>
-                      <a:endParaRPr lang="en-US" sz="1300"/>
-                    </a:p>
-                  </a:txBody>
-                  <a:tcPr/>
-                </a:tc>
-                <a:tc>
-                  <a:txBody>
-                    <a:bodyPr/>
-                    <a:lstStyle/>
-                    <a:p>
-                      <a:r>
-                        <a:rPr lang="en-US" sz="1300" baseline="0" dirty="0" smtClean="0"/>
-                        <a:t>Measure the  width along the 50m route on the S.W. and compare it to that derived from the SLAM</a:t>
-                      </a:r>
-                      <a:endParaRPr lang="en-US" sz="1300" dirty="0"/>
-                    </a:p>
-                  </a:txBody>
-                  <a:tcPr/>
-                </a:tc>
-                <a:tc>
-                  <a:txBody>
-                    <a:bodyPr/>
-                    <a:lstStyle/>
-                    <a:p>
-                      <a:r>
-                        <a:rPr lang="en-US" sz="1300" dirty="0" smtClean="0"/>
-                        <a:t>Control </a:t>
-                      </a:r>
-                      <a:endParaRPr lang="en-US" sz="1300" dirty="0"/>
-                    </a:p>
-                  </a:txBody>
-                  <a:tcPr/>
-                </a:tc>
-                <a:tc>
-                  <a:txBody>
-                    <a:bodyPr/>
-                    <a:lstStyle/>
-                    <a:p>
-                      <a:r>
-                        <a:rPr lang="en-US" sz="1300" dirty="0" smtClean="0"/>
-                        <a:t>SLAM</a:t>
-                      </a:r>
-                      <a:endParaRPr lang="en-US" sz="1300" dirty="0"/>
-                    </a:p>
-                  </a:txBody>
-                  <a:tcPr/>
-                </a:tc>
-                <a:tc>
-                  <a:txBody>
-                    <a:bodyPr/>
-                    <a:lstStyle/>
-                    <a:p>
-                      <a:r>
-                        <a:rPr lang="en-US" sz="1300" dirty="0" smtClean="0"/>
-                        <a:t>Translations and yaw,</a:t>
-                      </a:r>
-                      <a:r>
-                        <a:rPr lang="en-US" sz="1300" baseline="0" dirty="0" smtClean="0"/>
-                        <a:t> </a:t>
-                      </a:r>
-                      <a:r>
-                        <a:rPr lang="en-US" sz="1300" dirty="0" smtClean="0"/>
-                        <a:t>D-frames - top view, </a:t>
-                      </a:r>
-                      <a:endParaRPr lang="en-US" sz="1300" dirty="0"/>
-                    </a:p>
-                  </a:txBody>
-                  <a:tcPr/>
-                </a:tc>
-                <a:tc>
-                  <a:txBody>
-                    <a:bodyPr/>
-                    <a:lstStyle/>
-                    <a:p>
-                      <a:r>
-                        <a:rPr lang="en-US" sz="1300" dirty="0" smtClean="0"/>
-                        <a:t>Scan matching</a:t>
-                      </a:r>
-                      <a:endParaRPr lang="en-US" sz="1300" dirty="0"/>
-                    </a:p>
-                  </a:txBody>
-                  <a:tcPr/>
-                </a:tc>
-                <a:tc>
-                  <a:txBody>
-                    <a:bodyPr/>
-                    <a:lstStyle/>
-                    <a:p>
-                      <a:r>
-                        <a:rPr lang="en-US" sz="1300" dirty="0" smtClean="0"/>
-                        <a:t>SLAM</a:t>
-                      </a:r>
-                      <a:endParaRPr lang="en-US" sz="1300" dirty="0"/>
-                    </a:p>
-                  </a:txBody>
-                  <a:tcPr/>
-                </a:tc>
-                <a:extLst>
-                  <a:ext uri="{0D108BD9-81ED-4DB2-BD59-A6C34878D82A}">
-                    <a16:rowId xmlns:a16="http://schemas.microsoft.com/office/drawing/2014/main" val="1600335779"/>
-                  </a:ext>
-                </a:extLst>
-              </a:tr>
-              <a:tr h="370840">
-                <a:tc>
-                  <a:txBody>
-                    <a:bodyPr/>
-                    <a:lstStyle/>
-                    <a:p>
-                      <a:endParaRPr lang="en-US" sz="1300"/>
-                    </a:p>
-                  </a:txBody>
-                  <a:tcPr/>
-                </a:tc>
-                <a:tc>
-                  <a:txBody>
-                    <a:bodyPr/>
-                    <a:lstStyle/>
-                    <a:p>
-                      <a:endParaRPr lang="en-US" sz="1300" dirty="0"/>
-                    </a:p>
-                  </a:txBody>
-                  <a:tcPr/>
-                </a:tc>
-                <a:tc>
-                  <a:txBody>
-                    <a:bodyPr/>
-                    <a:lstStyle/>
-                    <a:p>
-                      <a:r>
-                        <a:rPr lang="en-US" sz="1300" dirty="0" smtClean="0"/>
-                        <a:t>User feedback</a:t>
-                      </a:r>
-                      <a:endParaRPr lang="en-US" sz="1300" dirty="0"/>
-                    </a:p>
-                  </a:txBody>
-                  <a:tcPr/>
-                </a:tc>
-                <a:tc>
-                  <a:txBody>
-                    <a:bodyPr/>
-                    <a:lstStyle/>
-                    <a:p>
-                      <a:r>
-                        <a:rPr lang="en-US" sz="1300" dirty="0" smtClean="0"/>
-                        <a:t>Vibration control </a:t>
-                      </a:r>
-                      <a:endParaRPr lang="en-US" sz="1300" dirty="0"/>
-                    </a:p>
-                  </a:txBody>
-                  <a:tcPr/>
-                </a:tc>
-                <a:tc>
-                  <a:txBody>
-                    <a:bodyPr/>
-                    <a:lstStyle/>
-                    <a:p>
-                      <a:r>
-                        <a:rPr lang="en-US" sz="1300" dirty="0" smtClean="0"/>
-                        <a:t>SLAM</a:t>
-                      </a:r>
-                      <a:endParaRPr lang="en-US" sz="1300" dirty="0"/>
-                    </a:p>
-                  </a:txBody>
-                  <a:tcPr/>
-                </a:tc>
-                <a:tc>
-                  <a:txBody>
-                    <a:bodyPr/>
-                    <a:lstStyle/>
-                    <a:p>
-                      <a:r>
-                        <a:rPr lang="en-US" sz="1300" dirty="0" smtClean="0"/>
-                        <a:t>SLAM</a:t>
-                      </a:r>
-                      <a:endParaRPr lang="en-US" sz="1300" dirty="0"/>
-                    </a:p>
-                  </a:txBody>
-                  <a:tcPr/>
-                </a:tc>
-                <a:tc>
-                  <a:txBody>
-                    <a:bodyPr/>
-                    <a:lstStyle/>
-                    <a:p>
-                      <a:r>
-                        <a:rPr lang="en-US" sz="1300" dirty="0" smtClean="0"/>
-                        <a:t>Control</a:t>
-                      </a:r>
-                      <a:endParaRPr lang="en-US" sz="1300" dirty="0"/>
-                    </a:p>
-                  </a:txBody>
-                  <a:tcPr/>
-                </a:tc>
-                <a:extLst>
-                  <a:ext uri="{0D108BD9-81ED-4DB2-BD59-A6C34878D82A}">
-                    <a16:rowId xmlns:a16="http://schemas.microsoft.com/office/drawing/2014/main" val="4139309466"/>
-                  </a:ext>
-                </a:extLst>
-              </a:tr>
-              <a:tr h="370840">
-                <a:tc>
-                  <a:txBody>
-                    <a:bodyPr/>
-                    <a:lstStyle/>
-                    <a:p>
-                      <a:endParaRPr lang="en-US" sz="1300"/>
-                    </a:p>
-                  </a:txBody>
-                  <a:tcPr/>
-                </a:tc>
-                <a:tc>
-                  <a:txBody>
-                    <a:bodyPr/>
-                    <a:lstStyle/>
-                    <a:p>
-                      <a:endParaRPr lang="en-US" sz="1300" dirty="0"/>
-                    </a:p>
-                  </a:txBody>
-                  <a:tcPr/>
-                </a:tc>
-                <a:tc>
-                  <a:txBody>
-                    <a:bodyPr/>
-                    <a:lstStyle/>
-                    <a:p>
-                      <a:r>
-                        <a:rPr lang="en-US" sz="1300" dirty="0" smtClean="0"/>
-                        <a:t>NA</a:t>
-                      </a:r>
-                      <a:endParaRPr lang="en-US" sz="1300" dirty="0"/>
-                    </a:p>
-                  </a:txBody>
-                  <a:tcPr/>
-                </a:tc>
-                <a:tc>
-                  <a:txBody>
-                    <a:bodyPr/>
-                    <a:lstStyle/>
-                    <a:p>
-                      <a:r>
-                        <a:rPr lang="en-US" sz="1300" dirty="0" smtClean="0"/>
-                        <a:t>Activating # motor 1/ 2/ 3</a:t>
-                      </a:r>
-                      <a:endParaRPr lang="en-US" sz="1300" dirty="0"/>
-                    </a:p>
-                  </a:txBody>
-                  <a:tcPr/>
-                </a:tc>
-                <a:tc>
-                  <a:txBody>
-                    <a:bodyPr/>
-                    <a:lstStyle/>
-                    <a:p>
-                      <a:r>
-                        <a:rPr lang="en-US" sz="1300" dirty="0" smtClean="0"/>
-                        <a:t>Activating motor # 1/ 2/ 3</a:t>
-                      </a:r>
-                      <a:endParaRPr lang="en-US" sz="1300" dirty="0"/>
-                    </a:p>
-                  </a:txBody>
-                  <a:tcPr/>
-                </a:tc>
-                <a:tc>
-                  <a:txBody>
-                    <a:bodyPr/>
-                    <a:lstStyle/>
-                    <a:p>
-                      <a:r>
-                        <a:rPr lang="en-US" sz="1300" dirty="0" smtClean="0"/>
-                        <a:t>Control</a:t>
-                      </a:r>
-                      <a:endParaRPr lang="en-US" sz="1300" dirty="0"/>
-                    </a:p>
-                  </a:txBody>
-                  <a:tcPr/>
-                </a:tc>
-                <a:tc>
-                  <a:txBody>
-                    <a:bodyPr/>
-                    <a:lstStyle/>
-                    <a:p>
-                      <a:r>
-                        <a:rPr lang="en-US" sz="1300" dirty="0" smtClean="0"/>
-                        <a:t>User feedback</a:t>
-                      </a:r>
-                      <a:endParaRPr lang="en-US" sz="1300" dirty="0"/>
-                    </a:p>
-                  </a:txBody>
-                  <a:tcPr/>
-                </a:tc>
-                <a:extLst>
-                  <a:ext uri="{0D108BD9-81ED-4DB2-BD59-A6C34878D82A}">
-                    <a16:rowId xmlns:a16="http://schemas.microsoft.com/office/drawing/2014/main" val="3162205224"/>
-                  </a:ext>
-                </a:extLst>
-              </a:tr>
-            </a:tbl>
-          </a:graphicData>
-        </a:graphic>
-      </p:graphicFrame>
+            <a:r>
+              <a:rPr lang="en-US" dirty="0"/>
+              <a:t>Sensing unit</a:t>
+            </a:r>
+          </a:p>
+        </p:txBody>
+      </p:sp>
+      <p:cxnSp>
+        <p:nvCxnSpPr>
+          <p:cNvPr id="6" name="Straight Arrow Connector 5"/>
+          <p:cNvCxnSpPr/>
+          <p:nvPr/>
+        </p:nvCxnSpPr>
+        <p:spPr>
+          <a:xfrm flipH="1">
+            <a:off x="6716316" y="3628905"/>
+            <a:ext cx="384351" cy="1"/>
+          </a:xfrm>
+          <a:prstGeom prst="straightConnector1">
+            <a:avLst/>
+          </a:prstGeom>
+          <a:ln>
+            <a:solidFill>
+              <a:schemeClr val="bg1"/>
+            </a:solidFill>
+            <a:tailEnd type="triangle"/>
+          </a:ln>
+        </p:spPr>
+        <p:style>
+          <a:lnRef idx="1">
+            <a:schemeClr val="accent1"/>
+          </a:lnRef>
+          <a:fillRef idx="0">
+            <a:schemeClr val="accent1"/>
+          </a:fillRef>
+          <a:effectRef idx="0">
+            <a:schemeClr val="accent1"/>
+          </a:effectRef>
+          <a:fontRef idx="minor">
+            <a:schemeClr val="tx1"/>
+          </a:fontRef>
+        </p:style>
+      </p:cxnSp>
+      <p:sp>
+        <p:nvSpPr>
+          <p:cNvPr id="8" name="TextBox 7"/>
+          <p:cNvSpPr txBox="1"/>
+          <p:nvPr/>
+        </p:nvSpPr>
+        <p:spPr>
+          <a:xfrm>
+            <a:off x="6278880" y="5451565"/>
+            <a:ext cx="1619793" cy="369332"/>
+          </a:xfrm>
+          <a:prstGeom prst="rect">
+            <a:avLst/>
+          </a:prstGeom>
+          <a:solidFill>
+            <a:schemeClr val="bg1"/>
+          </a:solidFill>
+          <a:ln>
+            <a:solidFill>
+              <a:schemeClr val="bg1"/>
+            </a:solidFill>
+          </a:ln>
+        </p:spPr>
+        <p:txBody>
+          <a:bodyPr wrap="square" rtlCol="1">
+            <a:spAutoFit/>
+          </a:bodyPr>
+          <a:lstStyle/>
+          <a:p>
+            <a:r>
+              <a:rPr lang="en-US" dirty="0"/>
+              <a:t>processing unit</a:t>
+            </a:r>
+          </a:p>
+        </p:txBody>
+      </p:sp>
+      <p:cxnSp>
+        <p:nvCxnSpPr>
+          <p:cNvPr id="9" name="Straight Arrow Connector 8"/>
+          <p:cNvCxnSpPr/>
+          <p:nvPr/>
+        </p:nvCxnSpPr>
+        <p:spPr>
+          <a:xfrm flipH="1">
+            <a:off x="5971734" y="5636230"/>
+            <a:ext cx="384351" cy="1"/>
+          </a:xfrm>
+          <a:prstGeom prst="straightConnector1">
+            <a:avLst/>
+          </a:prstGeom>
+          <a:ln>
+            <a:solidFill>
+              <a:schemeClr val="bg1"/>
+            </a:solidFill>
+            <a:tailEnd type="triangle"/>
+          </a:ln>
+        </p:spPr>
+        <p:style>
+          <a:lnRef idx="1">
+            <a:schemeClr val="accent1"/>
+          </a:lnRef>
+          <a:fillRef idx="0">
+            <a:schemeClr val="accent1"/>
+          </a:fillRef>
+          <a:effectRef idx="0">
+            <a:schemeClr val="accent1"/>
+          </a:effectRef>
+          <a:fontRef idx="minor">
+            <a:schemeClr val="tx1"/>
+          </a:fontRef>
+        </p:style>
+      </p:cxnSp>
+      <p:sp>
+        <p:nvSpPr>
+          <p:cNvPr id="10" name="TextBox 9"/>
+          <p:cNvSpPr txBox="1"/>
+          <p:nvPr/>
+        </p:nvSpPr>
+        <p:spPr>
+          <a:xfrm>
+            <a:off x="6056642" y="4720327"/>
+            <a:ext cx="1563358" cy="369332"/>
+          </a:xfrm>
+          <a:prstGeom prst="rect">
+            <a:avLst/>
+          </a:prstGeom>
+          <a:solidFill>
+            <a:schemeClr val="bg1"/>
+          </a:solidFill>
+          <a:ln>
+            <a:solidFill>
+              <a:schemeClr val="bg1"/>
+            </a:solidFill>
+          </a:ln>
+        </p:spPr>
+        <p:txBody>
+          <a:bodyPr wrap="square" rtlCol="1">
+            <a:spAutoFit/>
+          </a:bodyPr>
+          <a:lstStyle/>
+          <a:p>
+            <a:r>
+              <a:rPr lang="en-US" dirty="0"/>
+              <a:t>Feedback  unit</a:t>
+            </a:r>
+          </a:p>
+        </p:txBody>
+      </p:sp>
+      <p:cxnSp>
+        <p:nvCxnSpPr>
+          <p:cNvPr id="11" name="Straight Arrow Connector 10"/>
+          <p:cNvCxnSpPr/>
+          <p:nvPr/>
+        </p:nvCxnSpPr>
+        <p:spPr>
+          <a:xfrm flipH="1">
+            <a:off x="5672291" y="4904992"/>
+            <a:ext cx="384351" cy="1"/>
+          </a:xfrm>
+          <a:prstGeom prst="straightConnector1">
+            <a:avLst/>
+          </a:prstGeom>
+          <a:ln>
+            <a:solidFill>
+              <a:schemeClr val="bg1"/>
+            </a:solidFill>
+            <a:tailEnd type="triangle"/>
+          </a:ln>
+        </p:spPr>
+        <p:style>
+          <a:lnRef idx="1">
+            <a:schemeClr val="accent1"/>
+          </a:lnRef>
+          <a:fillRef idx="0">
+            <a:schemeClr val="accent1"/>
+          </a:fillRef>
+          <a:effectRef idx="0">
+            <a:schemeClr val="accent1"/>
+          </a:effectRef>
+          <a:fontRef idx="minor">
+            <a:schemeClr val="tx1"/>
+          </a:fontRef>
+        </p:style>
+      </p:cxnSp>
+      <p:pic>
+        <p:nvPicPr>
+          <p:cNvPr id="3" name="Picture 2"/>
+          <p:cNvPicPr>
+            <a:picLocks noChangeAspect="1"/>
+          </p:cNvPicPr>
+          <p:nvPr/>
+        </p:nvPicPr>
+        <p:blipFill rotWithShape="1">
+          <a:blip r:embed="rId3"/>
+          <a:srcRect l="22976" t="18572" r="39881" b="38889"/>
+          <a:stretch/>
+        </p:blipFill>
+        <p:spPr>
+          <a:xfrm>
+            <a:off x="9055657" y="4904992"/>
+            <a:ext cx="3052354" cy="1966421"/>
+          </a:xfrm>
+          <a:prstGeom prst="rect">
+            <a:avLst/>
+          </a:prstGeom>
+        </p:spPr>
+      </p:pic>
     </p:spTree>
     <p:extLst>
       <p:ext uri="{BB962C8B-B14F-4D97-AF65-F5344CB8AC3E}">
-        <p14:creationId xmlns:p14="http://schemas.microsoft.com/office/powerpoint/2010/main" val="2438966983"/>
+        <p14:creationId xmlns:p14="http://schemas.microsoft.com/office/powerpoint/2010/main" val="1348604295"/>
       </p:ext>
     </p:extLst>
   </p:cSld>
   <p:clrMapOvr>
     <a:masterClrMapping/>
   </p:clrMapOvr>
-  <p:timing>
-    <p:tnLst>
-      <p:par>
-        <p:cTn id="1" dur="indefinite" restart="never" nodeType="tmRoot"/>
-      </p:par>
-    </p:tnLst>
-  </p:timing>
 </p:sld>
 </file>
 
@@ -4062,6 +3281,110 @@
       </p:grpSpPr>
       <p:sp>
         <p:nvSpPr>
+          <p:cNvPr id="2" name="Title 1"/>
+          <p:cNvSpPr>
+            <a:spLocks noGrp="1"/>
+          </p:cNvSpPr>
+          <p:nvPr>
+            <p:ph type="title"/>
+          </p:nvPr>
+        </p:nvSpPr>
+        <p:spPr/>
+        <p:txBody>
+          <a:bodyPr/>
+          <a:lstStyle/>
+          <a:p>
+            <a:pPr algn="ctr"/>
+            <a:r>
+              <a:rPr lang="en-US" dirty="0"/>
+              <a:t>Tasks for part 1 of the project</a:t>
+            </a:r>
+          </a:p>
+        </p:txBody>
+      </p:sp>
+      <p:sp>
+        <p:nvSpPr>
+          <p:cNvPr id="3" name="Content Placeholder 2"/>
+          <p:cNvSpPr>
+            <a:spLocks noGrp="1"/>
+          </p:cNvSpPr>
+          <p:nvPr>
+            <p:ph idx="1"/>
+          </p:nvPr>
+        </p:nvSpPr>
+        <p:spPr/>
+        <p:txBody>
+          <a:bodyPr/>
+          <a:lstStyle/>
+          <a:p>
+            <a:pPr marL="514350" indent="-514350">
+              <a:buAutoNum type="arabicPeriod"/>
+            </a:pPr>
+            <a:r>
+              <a:rPr lang="en-US" dirty="0"/>
+              <a:t>Reduce algorithm run time in Python to 120 </a:t>
+            </a:r>
+            <a:r>
+              <a:rPr lang="en-US" dirty="0" err="1"/>
+              <a:t>ms</a:t>
+            </a:r>
+            <a:r>
+              <a:rPr lang="en-US" dirty="0"/>
+              <a:t> for each frame</a:t>
+            </a:r>
+          </a:p>
+          <a:p>
+            <a:pPr marL="514350" indent="-514350">
+              <a:buAutoNum type="arabicPeriod"/>
+            </a:pPr>
+            <a:r>
+              <a:rPr lang="en-US" dirty="0"/>
+              <a:t>Generate SLAM in off-line and on-line modes</a:t>
+            </a:r>
+          </a:p>
+          <a:p>
+            <a:pPr marL="514350" indent="-514350">
+              <a:buAutoNum type="arabicPeriod"/>
+            </a:pPr>
+            <a:r>
+              <a:rPr lang="en-US" dirty="0"/>
+              <a:t>Generate control in off-line and on-line modes</a:t>
+            </a:r>
+          </a:p>
+        </p:txBody>
+      </p:sp>
+    </p:spTree>
+    <p:extLst>
+      <p:ext uri="{BB962C8B-B14F-4D97-AF65-F5344CB8AC3E}">
+        <p14:creationId xmlns:p14="http://schemas.microsoft.com/office/powerpoint/2010/main" val="3378678691"/>
+      </p:ext>
+    </p:extLst>
+  </p:cSld>
+  <p:clrMapOvr>
+    <a:masterClrMapping/>
+  </p:clrMapOvr>
+</p:sld>
+</file>
+
+<file path=ppt/slides/slide3.xml><?xml version="1.0" encoding="utf-8"?>
+<p:sld xmlns:a="http://schemas.openxmlformats.org/drawingml/2006/main" xmlns:r="http://schemas.openxmlformats.org/officeDocument/2006/relationships" xmlns:p="http://schemas.openxmlformats.org/presentationml/2006/main">
+  <p:cSld>
+    <p:spTree>
+      <p:nvGrpSpPr>
+        <p:cNvPr id="1" name=""/>
+        <p:cNvGrpSpPr/>
+        <p:nvPr/>
+      </p:nvGrpSpPr>
+      <p:grpSpPr>
+        <a:xfrm>
+          <a:off x="0" y="0"/>
+          <a:ext cx="0" cy="0"/>
+          <a:chOff x="0" y="0"/>
+          <a:chExt cx="0" cy="0"/>
+        </a:xfrm>
+      </p:grpSpPr>
+      <p:sp>
+        <p:nvSpPr>
           <p:cNvPr id="4" name="TextBox 3"/>
           <p:cNvSpPr txBox="1"/>
           <p:nvPr/>
@@ -4077,7 +3400,7 @@
           <a:noFill/>
           <a:ln>
             <a:solidFill>
-              <a:schemeClr val="tx1"/>
+              <a:srgbClr val="FF0000"/>
             </a:solidFill>
           </a:ln>
         </p:spPr>
@@ -4091,7 +3414,6 @@
               <a:rPr lang="en-US" dirty="0"/>
               <a:t>P.C. Plane fit </a:t>
             </a:r>
-            <a:endParaRPr lang="en-US" dirty="0"/>
           </a:p>
         </p:txBody>
       </p:sp>
@@ -4123,14 +3445,9 @@
           <a:lstStyle/>
           <a:p>
             <a:r>
-              <a:rPr lang="en-US" dirty="0" smtClean="0"/>
-              <a:t>Euler angles pitch </a:t>
-            </a:r>
-            <a:r>
-              <a:rPr lang="en-US" dirty="0" smtClean="0"/>
-              <a:t>and roll (IMU)</a:t>
-            </a:r>
-            <a:endParaRPr lang="en-US" dirty="0"/>
+              <a:rPr lang="en-US" dirty="0"/>
+              <a:t>Euler angles pitch and roll (IMU)</a:t>
+            </a:r>
           </a:p>
         </p:txBody>
       </p:sp>
@@ -4162,10 +3479,9 @@
           <a:lstStyle/>
           <a:p>
             <a:r>
-              <a:rPr lang="en-US" dirty="0" smtClean="0"/>
+              <a:rPr lang="en-US" dirty="0"/>
               <a:t>R.S. P.C.</a:t>
             </a:r>
-            <a:endParaRPr lang="en-US" dirty="0"/>
           </a:p>
         </p:txBody>
       </p:sp>
@@ -4177,7 +3493,7 @@
         </p:nvSpPr>
         <p:spPr>
           <a:xfrm>
-            <a:off x="2922698" y="4783742"/>
+            <a:off x="2931125" y="4801979"/>
             <a:ext cx="2143018" cy="369332"/>
           </a:xfrm>
           <a:prstGeom prst="rect">
@@ -4186,7 +3502,7 @@
           <a:noFill/>
           <a:ln>
             <a:solidFill>
-              <a:schemeClr val="tx1"/>
+              <a:srgbClr val="FF0000"/>
             </a:solidFill>
           </a:ln>
         </p:spPr>
@@ -4200,7 +3516,6 @@
               <a:rPr lang="en-US" dirty="0"/>
               <a:t>Translation filter</a:t>
             </a:r>
-            <a:endParaRPr lang="en-US" dirty="0"/>
           </a:p>
         </p:txBody>
       </p:sp>
@@ -4284,7 +3599,7 @@
           <a:noFill/>
           <a:ln>
             <a:solidFill>
-              <a:schemeClr val="tx1"/>
+              <a:srgbClr val="FF0000"/>
             </a:solidFill>
           </a:ln>
         </p:spPr>
@@ -4294,17 +3609,17 @@
           </a:bodyPr>
           <a:lstStyle/>
           <a:p>
-            <a:endParaRPr lang="en-US" dirty="0" smtClean="0"/>
-          </a:p>
-          <a:p>
             <a:endParaRPr lang="en-US" dirty="0"/>
           </a:p>
           <a:p>
-            <a:endParaRPr lang="en-US" dirty="0" smtClean="0"/>
-          </a:p>
-          <a:p>
-            <a:r>
-              <a:rPr lang="en-US" dirty="0" smtClean="0"/>
+            <a:endParaRPr lang="en-US" dirty="0"/>
+          </a:p>
+          <a:p>
+            <a:endParaRPr lang="en-US" dirty="0"/>
+          </a:p>
+          <a:p>
+            <a:r>
+              <a:rPr lang="en-US" dirty="0"/>
               <a:t>Scan matching</a:t>
             </a:r>
           </a:p>
@@ -4312,7 +3627,7 @@
             <a:endParaRPr lang="en-US" dirty="0"/>
           </a:p>
           <a:p>
-            <a:endParaRPr lang="en-US" dirty="0" smtClean="0"/>
+            <a:endParaRPr lang="en-US" dirty="0"/>
           </a:p>
           <a:p>
             <a:endParaRPr lang="en-US" dirty="0"/>
@@ -4429,10 +3744,9 @@
           <a:lstStyle/>
           <a:p>
             <a:r>
-              <a:rPr lang="en-US" dirty="0" smtClean="0"/>
+              <a:rPr lang="en-US" dirty="0"/>
               <a:t>Motion direction</a:t>
             </a:r>
-            <a:endParaRPr lang="en-US" dirty="0"/>
           </a:p>
         </p:txBody>
       </p:sp>
@@ -4502,14 +3816,9 @@
           <a:lstStyle/>
           <a:p>
             <a:r>
-              <a:rPr lang="en-US" dirty="0" smtClean="0"/>
-              <a:t>Euler angle yaw </a:t>
-            </a:r>
-            <a:r>
-              <a:rPr lang="en-US" dirty="0" smtClean="0"/>
-              <a:t>(IMU)</a:t>
-            </a:r>
-            <a:endParaRPr lang="en-US" dirty="0"/>
+              <a:rPr lang="en-US" dirty="0"/>
+              <a:t>Euler angle yaw (IMU)</a:t>
+            </a:r>
           </a:p>
         </p:txBody>
       </p:sp>
@@ -4602,7 +3911,7 @@
           <a:noFill/>
           <a:ln>
             <a:solidFill>
-              <a:schemeClr val="tx1"/>
+              <a:srgbClr val="FF0000"/>
             </a:solidFill>
           </a:ln>
         </p:spPr>
@@ -4612,11 +3921,11 @@
           </a:bodyPr>
           <a:lstStyle/>
           <a:p>
-            <a:endParaRPr lang="en-US" dirty="0" smtClean="0"/>
-          </a:p>
-          <a:p>
-            <a:r>
-              <a:rPr lang="en-US" dirty="0" smtClean="0"/>
+            <a:endParaRPr lang="en-US" dirty="0"/>
+          </a:p>
+          <a:p>
+            <a:r>
+              <a:rPr lang="en-US" dirty="0"/>
               <a:t>SLAM</a:t>
             </a:r>
           </a:p>
@@ -4678,7 +3987,7 @@
           <a:noFill/>
           <a:ln>
             <a:solidFill>
-              <a:schemeClr val="tx1"/>
+              <a:srgbClr val="FF0000"/>
             </a:solidFill>
           </a:ln>
         </p:spPr>
@@ -4688,11 +3997,11 @@
           </a:bodyPr>
           <a:lstStyle/>
           <a:p>
-            <a:endParaRPr lang="en-US" dirty="0" smtClean="0"/>
-          </a:p>
-          <a:p>
-            <a:r>
-              <a:rPr lang="en-US" dirty="0" smtClean="0"/>
+            <a:endParaRPr lang="en-US" dirty="0"/>
+          </a:p>
+          <a:p>
+            <a:r>
+              <a:rPr lang="en-US" dirty="0"/>
               <a:t>Control</a:t>
             </a:r>
           </a:p>
@@ -4765,11 +4074,11 @@
           <a:lstStyle/>
           <a:p>
             <a:r>
-              <a:rPr lang="en-US" dirty="0" smtClean="0"/>
+              <a:rPr lang="en-US" dirty="0"/>
               <a:t>R.S. </a:t>
             </a:r>
             <a:r>
-              <a:rPr lang="en-US" dirty="0" err="1" smtClean="0"/>
+              <a:rPr lang="en-US" dirty="0" err="1"/>
               <a:t>ax,ay,az</a:t>
             </a:r>
             <a:endParaRPr lang="en-US" dirty="0"/>
@@ -4842,10 +4151,9 @@
           <a:lstStyle/>
           <a:p>
             <a:r>
-              <a:rPr lang="en-US" dirty="0" smtClean="0"/>
+              <a:rPr lang="en-US" dirty="0"/>
               <a:t>R.S. texture</a:t>
             </a:r>
-            <a:endParaRPr lang="en-US" dirty="0"/>
           </a:p>
         </p:txBody>
       </p:sp>
@@ -4902,7 +4210,7 @@
           <a:noFill/>
           <a:ln>
             <a:solidFill>
-              <a:schemeClr val="tx1"/>
+              <a:srgbClr val="FF0000"/>
             </a:solidFill>
           </a:ln>
         </p:spPr>
@@ -4912,11 +4220,11 @@
           </a:bodyPr>
           <a:lstStyle/>
           <a:p>
-            <a:endParaRPr lang="en-US" dirty="0" smtClean="0"/>
-          </a:p>
-          <a:p>
-            <a:r>
-              <a:rPr lang="en-US" dirty="0" smtClean="0"/>
+            <a:endParaRPr lang="en-US" dirty="0"/>
+          </a:p>
+          <a:p>
+            <a:r>
+              <a:rPr lang="en-US" dirty="0"/>
               <a:t>User feedback </a:t>
             </a:r>
           </a:p>
@@ -5003,7 +4311,7 @@
           </a:lstStyle>
           <a:p>
             <a:r>
-              <a:rPr lang="en-US" sz="3600" smtClean="0"/>
+              <a:rPr lang="en-US" sz="3600"/>
               <a:t>Bypassing obstacles on S.W. – algorithm modules </a:t>
             </a:r>
             <a:endParaRPr lang="en-US" sz="3600" dirty="0"/>
@@ -5020,13 +4328,2179 @@
   <p:clrMapOvr>
     <a:masterClrMapping/>
   </p:clrMapOvr>
-  <p:timing>
-    <p:tnLst>
-      <p:par>
-        <p:cTn id="1" dur="indefinite" restart="never" nodeType="tmRoot"/>
-      </p:par>
-    </p:tnLst>
-  </p:timing>
+</p:sld>
+</file>
+
+<file path=ppt/slides/slide4.xml><?xml version="1.0" encoding="utf-8"?>
+<p:sld xmlns:a="http://schemas.openxmlformats.org/drawingml/2006/main" xmlns:r="http://schemas.openxmlformats.org/officeDocument/2006/relationships" xmlns:p="http://schemas.openxmlformats.org/presentationml/2006/main">
+  <p:cSld>
+    <p:spTree>
+      <p:nvGrpSpPr>
+        <p:cNvPr id="1" name=""/>
+        <p:cNvGrpSpPr/>
+        <p:nvPr/>
+      </p:nvGrpSpPr>
+      <p:grpSpPr>
+        <a:xfrm>
+          <a:off x="0" y="0"/>
+          <a:ext cx="0" cy="0"/>
+          <a:chOff x="0" y="0"/>
+          <a:chExt cx="0" cy="0"/>
+        </a:xfrm>
+      </p:grpSpPr>
+      <p:sp>
+        <p:nvSpPr>
+          <p:cNvPr id="2" name="Title 1"/>
+          <p:cNvSpPr>
+            <a:spLocks noGrp="1"/>
+          </p:cNvSpPr>
+          <p:nvPr>
+            <p:ph type="title"/>
+          </p:nvPr>
+        </p:nvSpPr>
+        <p:spPr>
+          <a:xfrm>
+            <a:off x="838200" y="92937"/>
+            <a:ext cx="10515600" cy="1325563"/>
+          </a:xfrm>
+        </p:spPr>
+        <p:txBody>
+          <a:bodyPr>
+            <a:normAutofit/>
+          </a:bodyPr>
+          <a:lstStyle/>
+          <a:p>
+            <a:pPr algn="ctr"/>
+            <a:r>
+              <a:rPr lang="en-US" sz="3600" dirty="0"/>
+              <a:t>Bypassing obstacles on S.W. – algorithm modules </a:t>
+            </a:r>
+          </a:p>
+        </p:txBody>
+      </p:sp>
+      <p:graphicFrame>
+        <p:nvGraphicFramePr>
+          <p:cNvPr id="4" name="Content Placeholder 3"/>
+          <p:cNvGraphicFramePr>
+            <a:graphicFrameLocks noGrp="1"/>
+          </p:cNvGraphicFramePr>
+          <p:nvPr>
+            <p:ph idx="1"/>
+            <p:extLst>
+              <p:ext uri="{D42A27DB-BD31-4B8C-83A1-F6EECF244321}">
+                <p14:modId xmlns:p14="http://schemas.microsoft.com/office/powerpoint/2010/main" val="218972334"/>
+              </p:ext>
+            </p:extLst>
+          </p:nvPr>
+        </p:nvGraphicFramePr>
+        <p:xfrm>
+          <a:off x="838197" y="973863"/>
+          <a:ext cx="10515603" cy="5791200"/>
+        </p:xfrm>
+        <a:graphic>
+          <a:graphicData uri="http://schemas.openxmlformats.org/drawingml/2006/table">
+            <a:tbl>
+              <a:tblPr rtl="1" firstRow="1" bandRow="1">
+                <a:tableStyleId>{5C22544A-7EE6-4342-B048-85BDC9FD1C3A}</a:tableStyleId>
+              </a:tblPr>
+              <a:tblGrid>
+                <a:gridCol w="1025434">
+                  <a:extLst>
+                    <a:ext uri="{9D8B030D-6E8A-4147-A177-3AD203B41FA5}">
+                      <a16:colId xmlns:a16="http://schemas.microsoft.com/office/drawing/2014/main" val="3584997908"/>
+                    </a:ext>
+                  </a:extLst>
+                </a:gridCol>
+                <a:gridCol w="2168435">
+                  <a:extLst>
+                    <a:ext uri="{9D8B030D-6E8A-4147-A177-3AD203B41FA5}">
+                      <a16:colId xmlns:a16="http://schemas.microsoft.com/office/drawing/2014/main" val="985795155"/>
+                    </a:ext>
+                  </a:extLst>
+                </a:gridCol>
+                <a:gridCol w="1062445">
+                  <a:extLst>
+                    <a:ext uri="{9D8B030D-6E8A-4147-A177-3AD203B41FA5}">
+                      <a16:colId xmlns:a16="http://schemas.microsoft.com/office/drawing/2014/main" val="961473022"/>
+                    </a:ext>
+                  </a:extLst>
+                </a:gridCol>
+                <a:gridCol w="1534886">
+                  <a:extLst>
+                    <a:ext uri="{9D8B030D-6E8A-4147-A177-3AD203B41FA5}">
+                      <a16:colId xmlns:a16="http://schemas.microsoft.com/office/drawing/2014/main" val="871209325"/>
+                    </a:ext>
+                  </a:extLst>
+                </a:gridCol>
+                <a:gridCol w="1719945">
+                  <a:extLst>
+                    <a:ext uri="{9D8B030D-6E8A-4147-A177-3AD203B41FA5}">
+                      <a16:colId xmlns:a16="http://schemas.microsoft.com/office/drawing/2014/main" val="1724374475"/>
+                    </a:ext>
+                  </a:extLst>
+                </a:gridCol>
+                <a:gridCol w="1687284">
+                  <a:extLst>
+                    <a:ext uri="{9D8B030D-6E8A-4147-A177-3AD203B41FA5}">
+                      <a16:colId xmlns:a16="http://schemas.microsoft.com/office/drawing/2014/main" val="667892965"/>
+                    </a:ext>
+                  </a:extLst>
+                </a:gridCol>
+                <a:gridCol w="1317174">
+                  <a:extLst>
+                    <a:ext uri="{9D8B030D-6E8A-4147-A177-3AD203B41FA5}">
+                      <a16:colId xmlns:a16="http://schemas.microsoft.com/office/drawing/2014/main" val="3727366086"/>
+                    </a:ext>
+                  </a:extLst>
+                </a:gridCol>
+              </a:tblGrid>
+              <a:tr h="370840">
+                <a:tc>
+                  <a:txBody>
+                    <a:bodyPr/>
+                    <a:lstStyle/>
+                    <a:p>
+                      <a:r>
+                        <a:rPr lang="en-US" sz="1300" dirty="0"/>
+                        <a:t>Run-time </a:t>
+                      </a:r>
+                    </a:p>
+                  </a:txBody>
+                  <a:tcPr/>
+                </a:tc>
+                <a:tc>
+                  <a:txBody>
+                    <a:bodyPr/>
+                    <a:lstStyle/>
+                    <a:p>
+                      <a:r>
+                        <a:rPr lang="en-US" sz="1300" dirty="0"/>
+                        <a:t>Performance test </a:t>
+                      </a:r>
+                    </a:p>
+                  </a:txBody>
+                  <a:tcPr/>
+                </a:tc>
+                <a:tc>
+                  <a:txBody>
+                    <a:bodyPr/>
+                    <a:lstStyle/>
+                    <a:p>
+                      <a:r>
+                        <a:rPr lang="en-US" sz="1300" dirty="0"/>
+                        <a:t>Output module </a:t>
+                      </a:r>
+                    </a:p>
+                  </a:txBody>
+                  <a:tcPr/>
+                </a:tc>
+                <a:tc>
+                  <a:txBody>
+                    <a:bodyPr/>
+                    <a:lstStyle/>
+                    <a:p>
+                      <a:r>
+                        <a:rPr lang="en-US" sz="1300" dirty="0"/>
+                        <a:t>Output </a:t>
+                      </a:r>
+                    </a:p>
+                  </a:txBody>
+                  <a:tcPr/>
+                </a:tc>
+                <a:tc>
+                  <a:txBody>
+                    <a:bodyPr/>
+                    <a:lstStyle/>
+                    <a:p>
+                      <a:r>
+                        <a:rPr lang="en-US" sz="1300" dirty="0"/>
+                        <a:t>Input </a:t>
+                      </a:r>
+                    </a:p>
+                  </a:txBody>
+                  <a:tcPr/>
+                </a:tc>
+                <a:tc>
+                  <a:txBody>
+                    <a:bodyPr/>
+                    <a:lstStyle/>
+                    <a:p>
+                      <a:r>
+                        <a:rPr lang="en-US" sz="1300" dirty="0"/>
+                        <a:t>Input module</a:t>
+                      </a:r>
+                    </a:p>
+                  </a:txBody>
+                  <a:tcPr/>
+                </a:tc>
+                <a:tc>
+                  <a:txBody>
+                    <a:bodyPr/>
+                    <a:lstStyle/>
+                    <a:p>
+                      <a:r>
+                        <a:rPr lang="en-US" sz="1300" dirty="0"/>
+                        <a:t>Module</a:t>
+                      </a:r>
+                      <a:r>
+                        <a:rPr lang="en-US" sz="1300" baseline="0" dirty="0"/>
+                        <a:t> name</a:t>
+                      </a:r>
+                      <a:endParaRPr lang="en-US" sz="1300" dirty="0"/>
+                    </a:p>
+                  </a:txBody>
+                  <a:tcPr/>
+                </a:tc>
+                <a:extLst>
+                  <a:ext uri="{0D108BD9-81ED-4DB2-BD59-A6C34878D82A}">
+                    <a16:rowId xmlns:a16="http://schemas.microsoft.com/office/drawing/2014/main" val="278899944"/>
+                  </a:ext>
+                </a:extLst>
+              </a:tr>
+              <a:tr h="370840">
+                <a:tc>
+                  <a:txBody>
+                    <a:bodyPr/>
+                    <a:lstStyle/>
+                    <a:p>
+                      <a:r>
+                        <a:rPr lang="en-US" sz="1300" dirty="0" err="1"/>
+                        <a:t>Matlab</a:t>
+                      </a:r>
+                      <a:r>
+                        <a:rPr lang="en-US" sz="1300" dirty="0"/>
+                        <a:t>:</a:t>
+                      </a:r>
+                    </a:p>
+                    <a:p>
+                      <a:r>
+                        <a:rPr lang="en-US" sz="1300" dirty="0"/>
+                        <a:t>Python:  </a:t>
+                      </a:r>
+                    </a:p>
+                  </a:txBody>
+                  <a:tcPr/>
+                </a:tc>
+                <a:tc>
+                  <a:txBody>
+                    <a:bodyPr/>
+                    <a:lstStyle/>
+                    <a:p>
+                      <a:r>
+                        <a:rPr lang="en-US" sz="1300" dirty="0"/>
+                        <a:t>Walk for 50m and set stride parameters K1&amp;k2 such</a:t>
+                      </a:r>
+                      <a:r>
+                        <a:rPr lang="en-US" sz="1300" baseline="0" dirty="0"/>
+                        <a:t> that the</a:t>
+                      </a:r>
+                      <a:r>
+                        <a:rPr lang="en-US" sz="1300" dirty="0"/>
+                        <a:t> cumulative strides length is 50m</a:t>
+                      </a:r>
+                    </a:p>
+                  </a:txBody>
+                  <a:tcPr/>
+                </a:tc>
+                <a:tc>
+                  <a:txBody>
+                    <a:bodyPr/>
+                    <a:lstStyle/>
+                    <a:p>
+                      <a:r>
+                        <a:rPr lang="en-US" sz="1300" dirty="0"/>
+                        <a:t>Scan matching</a:t>
+                      </a:r>
+                    </a:p>
+                  </a:txBody>
+                  <a:tcPr/>
+                </a:tc>
+                <a:tc>
+                  <a:txBody>
+                    <a:bodyPr/>
+                    <a:lstStyle/>
+                    <a:p>
+                      <a:r>
+                        <a:rPr lang="en-US" sz="1300" dirty="0"/>
+                        <a:t>IMU X-Y</a:t>
+                      </a:r>
+                      <a:r>
+                        <a:rPr lang="en-US" sz="1300" baseline="0" dirty="0"/>
+                        <a:t> translations at 6Hz</a:t>
+                      </a:r>
+                      <a:endParaRPr lang="en-US" sz="1300" dirty="0"/>
+                    </a:p>
+                  </a:txBody>
+                  <a:tcPr/>
+                </a:tc>
+                <a:tc>
+                  <a:txBody>
+                    <a:bodyPr/>
+                    <a:lstStyle/>
+                    <a:p>
+                      <a:r>
+                        <a:rPr lang="en-US" sz="1300" dirty="0"/>
+                        <a:t>IMU acceleration raw data at 200Hz</a:t>
+                      </a:r>
+                    </a:p>
+                  </a:txBody>
+                  <a:tcPr/>
+                </a:tc>
+                <a:tc>
+                  <a:txBody>
+                    <a:bodyPr/>
+                    <a:lstStyle/>
+                    <a:p>
+                      <a:r>
+                        <a:rPr lang="en-US" sz="1300" dirty="0"/>
+                        <a:t>RealSense, IMU, accelerometer, </a:t>
+                      </a:r>
+                    </a:p>
+                  </a:txBody>
+                  <a:tcPr/>
+                </a:tc>
+                <a:tc>
+                  <a:txBody>
+                    <a:bodyPr/>
+                    <a:lstStyle/>
+                    <a:p>
+                      <a:r>
+                        <a:rPr lang="en-US" sz="1300" dirty="0"/>
+                        <a:t>Translation</a:t>
+                      </a:r>
+                      <a:r>
+                        <a:rPr lang="en-US" sz="1300" baseline="0" dirty="0"/>
+                        <a:t> filter</a:t>
+                      </a:r>
+                      <a:endParaRPr lang="en-US" sz="1300" dirty="0"/>
+                    </a:p>
+                  </a:txBody>
+                  <a:tcPr/>
+                </a:tc>
+                <a:extLst>
+                  <a:ext uri="{0D108BD9-81ED-4DB2-BD59-A6C34878D82A}">
+                    <a16:rowId xmlns:a16="http://schemas.microsoft.com/office/drawing/2014/main" val="3204104519"/>
+                  </a:ext>
+                </a:extLst>
+              </a:tr>
+              <a:tr h="370840">
+                <a:tc>
+                  <a:txBody>
+                    <a:bodyPr/>
+                    <a:lstStyle/>
+                    <a:p>
+                      <a:endParaRPr lang="en-US" sz="1300" dirty="0"/>
+                    </a:p>
+                  </a:txBody>
+                  <a:tcPr/>
+                </a:tc>
+                <a:tc>
+                  <a:txBody>
+                    <a:bodyPr/>
+                    <a:lstStyle/>
+                    <a:p>
+                      <a:r>
+                        <a:rPr lang="en-US" sz="1300" dirty="0"/>
+                        <a:t>Compare STD of P.C.</a:t>
+                      </a:r>
+                      <a:r>
+                        <a:rPr lang="en-US" sz="1300" baseline="0" dirty="0"/>
+                        <a:t> in z-axis </a:t>
+                      </a:r>
+                      <a:r>
+                        <a:rPr lang="en-US" sz="1300" dirty="0"/>
+                        <a:t>inside a bounding box around the center of the plane to a bounding frame surrounding this box</a:t>
+                      </a:r>
+                    </a:p>
+                  </a:txBody>
+                  <a:tcPr/>
+                </a:tc>
+                <a:tc>
+                  <a:txBody>
+                    <a:bodyPr/>
+                    <a:lstStyle/>
+                    <a:p>
+                      <a:r>
+                        <a:rPr lang="en-US" sz="1300" dirty="0"/>
+                        <a:t>Scan matching</a:t>
+                      </a:r>
+                    </a:p>
+                  </a:txBody>
+                  <a:tcPr/>
+                </a:tc>
+                <a:tc>
+                  <a:txBody>
+                    <a:bodyPr/>
+                    <a:lstStyle/>
+                    <a:p>
+                      <a:r>
+                        <a:rPr lang="en-US" sz="1300" dirty="0"/>
+                        <a:t>Rotated</a:t>
+                      </a:r>
+                      <a:r>
+                        <a:rPr lang="en-US" sz="1300" baseline="0" dirty="0"/>
+                        <a:t> P.C. frame  to fit S.W relative to X-Y plane </a:t>
+                      </a:r>
+                      <a:endParaRPr lang="en-US" sz="1300" dirty="0"/>
+                    </a:p>
+                  </a:txBody>
+                  <a:tcPr/>
+                </a:tc>
+                <a:tc>
+                  <a:txBody>
+                    <a:bodyPr/>
+                    <a:lstStyle/>
+                    <a:p>
+                      <a:r>
+                        <a:rPr lang="en-US" sz="1300" dirty="0"/>
+                        <a:t>P.C. ; </a:t>
+                      </a:r>
+                      <a:r>
+                        <a:rPr lang="en-US" sz="1300" dirty="0" err="1"/>
+                        <a:t>euler</a:t>
+                      </a:r>
+                      <a:r>
+                        <a:rPr lang="en-US" sz="1300" dirty="0"/>
+                        <a:t> angles (</a:t>
+                      </a:r>
+                      <a:r>
+                        <a:rPr lang="en-US" sz="1300" dirty="0" err="1"/>
+                        <a:t>madgwick</a:t>
+                      </a:r>
+                      <a:r>
+                        <a:rPr lang="en-US" sz="1300" dirty="0"/>
+                        <a:t> filter)</a:t>
+                      </a:r>
+                    </a:p>
+                  </a:txBody>
+                  <a:tcPr/>
+                </a:tc>
+                <a:tc>
+                  <a:txBody>
+                    <a:bodyPr/>
+                    <a:lstStyle/>
+                    <a:p>
+                      <a:pPr marL="342900" indent="-342900">
+                        <a:buAutoNum type="arabicPeriod"/>
+                      </a:pPr>
+                      <a:r>
+                        <a:rPr lang="en-US" sz="1300" dirty="0"/>
+                        <a:t>RealSense, P.C.</a:t>
+                      </a:r>
+                    </a:p>
+                    <a:p>
+                      <a:pPr marL="342900" marR="0" indent="-342900" algn="l" defTabSz="914400" rtl="0" eaLnBrk="1" fontAlgn="auto" latinLnBrk="0" hangingPunct="1">
+                        <a:lnSpc>
+                          <a:spcPct val="100000"/>
+                        </a:lnSpc>
+                        <a:spcBef>
+                          <a:spcPts val="0"/>
+                        </a:spcBef>
+                        <a:spcAft>
+                          <a:spcPts val="0"/>
+                        </a:spcAft>
+                        <a:buClrTx/>
+                        <a:buSzTx/>
+                        <a:buFontTx/>
+                        <a:buAutoNum type="arabicPeriod"/>
+                        <a:tabLst/>
+                        <a:defRPr/>
+                      </a:pPr>
+                      <a:r>
+                        <a:rPr lang="en-US" sz="1300" dirty="0"/>
+                        <a:t>Euler angles pitch and roll (IMU) </a:t>
+                      </a:r>
+                    </a:p>
+                  </a:txBody>
+                  <a:tcPr/>
+                </a:tc>
+                <a:tc>
+                  <a:txBody>
+                    <a:bodyPr/>
+                    <a:lstStyle/>
+                    <a:p>
+                      <a:r>
+                        <a:rPr lang="en-US" sz="1300" dirty="0"/>
+                        <a:t>P.C. Plane fit </a:t>
+                      </a:r>
+                    </a:p>
+                  </a:txBody>
+                  <a:tcPr/>
+                </a:tc>
+                <a:extLst>
+                  <a:ext uri="{0D108BD9-81ED-4DB2-BD59-A6C34878D82A}">
+                    <a16:rowId xmlns:a16="http://schemas.microsoft.com/office/drawing/2014/main" val="3969501889"/>
+                  </a:ext>
+                </a:extLst>
+              </a:tr>
+              <a:tr h="370840">
+                <a:tc>
+                  <a:txBody>
+                    <a:bodyPr/>
+                    <a:lstStyle/>
+                    <a:p>
+                      <a:endParaRPr lang="en-US" sz="1300"/>
+                    </a:p>
+                  </a:txBody>
+                  <a:tcPr/>
+                </a:tc>
+                <a:tc>
+                  <a:txBody>
+                    <a:bodyPr/>
+                    <a:lstStyle/>
+                    <a:p>
+                      <a:r>
+                        <a:rPr lang="en-US" sz="1300" dirty="0"/>
+                        <a:t>Compare translation based on IMU with translation based on scan</a:t>
+                      </a:r>
+                      <a:r>
+                        <a:rPr lang="en-US" sz="1300" baseline="0" dirty="0"/>
+                        <a:t> matching, compare yaw angle to derived yaw angle,</a:t>
+                      </a:r>
+                      <a:endParaRPr lang="en-US" sz="1300" dirty="0"/>
+                    </a:p>
+                  </a:txBody>
+                  <a:tcPr/>
+                </a:tc>
+                <a:tc>
+                  <a:txBody>
+                    <a:bodyPr/>
+                    <a:lstStyle/>
+                    <a:p>
+                      <a:r>
+                        <a:rPr lang="en-US" sz="1300" dirty="0"/>
+                        <a:t>SLAM</a:t>
+                      </a:r>
+                    </a:p>
+                  </a:txBody>
+                  <a:tcPr/>
+                </a:tc>
+                <a:tc>
+                  <a:txBody>
+                    <a:bodyPr/>
+                    <a:lstStyle/>
+                    <a:p>
+                      <a:r>
+                        <a:rPr lang="en-US" sz="1300" dirty="0"/>
+                        <a:t>Frame (</a:t>
+                      </a:r>
+                      <a:r>
+                        <a:rPr lang="en-US" sz="1300" dirty="0" err="1"/>
+                        <a:t>i</a:t>
+                      </a:r>
+                      <a:r>
+                        <a:rPr lang="en-US" sz="1300" dirty="0"/>
+                        <a:t> to i+1)</a:t>
+                      </a:r>
+                      <a:r>
+                        <a:rPr lang="en-US" sz="1300" baseline="0" dirty="0"/>
+                        <a:t> </a:t>
+                      </a:r>
+                      <a:r>
+                        <a:rPr lang="en-US" sz="1300" dirty="0"/>
+                        <a:t>translation</a:t>
+                      </a:r>
+                      <a:r>
+                        <a:rPr lang="en-US" sz="1300" baseline="0" dirty="0"/>
+                        <a:t> and yaw</a:t>
+                      </a:r>
+                      <a:r>
+                        <a:rPr lang="en-US" sz="1300" dirty="0"/>
+                        <a:t>;</a:t>
+                      </a:r>
+                      <a:r>
+                        <a:rPr lang="en-US" sz="1300" baseline="0" dirty="0"/>
+                        <a:t>  d-frame top view(above/below ground)</a:t>
+                      </a:r>
+                      <a:endParaRPr lang="en-US" sz="1300" dirty="0"/>
+                    </a:p>
+                  </a:txBody>
+                  <a:tcPr/>
+                </a:tc>
+                <a:tc>
+                  <a:txBody>
+                    <a:bodyPr/>
+                    <a:lstStyle/>
+                    <a:p>
+                      <a:pPr marL="0" marR="0" indent="0" algn="l" defTabSz="914400" rtl="0" eaLnBrk="1" fontAlgn="auto" latinLnBrk="0" hangingPunct="1">
+                        <a:lnSpc>
+                          <a:spcPct val="100000"/>
+                        </a:lnSpc>
+                        <a:spcBef>
+                          <a:spcPts val="0"/>
+                        </a:spcBef>
+                        <a:spcAft>
+                          <a:spcPts val="0"/>
+                        </a:spcAft>
+                        <a:buClrTx/>
+                        <a:buSzTx/>
+                        <a:buFontTx/>
+                        <a:buNone/>
+                        <a:tabLst/>
+                        <a:defRPr/>
+                      </a:pPr>
+                      <a:r>
+                        <a:rPr lang="en-US" sz="1300" dirty="0"/>
+                        <a:t>Rotated</a:t>
+                      </a:r>
+                      <a:r>
+                        <a:rPr lang="en-US" sz="1300" baseline="0" dirty="0"/>
+                        <a:t> P.C. frames (i-1 and </a:t>
+                      </a:r>
+                      <a:r>
+                        <a:rPr lang="en-US" sz="1300" baseline="0" dirty="0" err="1"/>
+                        <a:t>i</a:t>
+                      </a:r>
+                      <a:r>
+                        <a:rPr lang="en-US" sz="1300" baseline="0" dirty="0"/>
+                        <a:t>); frame (i-1 to </a:t>
+                      </a:r>
+                      <a:r>
+                        <a:rPr lang="en-US" sz="1300" baseline="0" dirty="0" err="1"/>
+                        <a:t>i</a:t>
+                      </a:r>
+                      <a:r>
+                        <a:rPr lang="en-US" sz="1300" baseline="0" dirty="0"/>
+                        <a:t>); IMU </a:t>
+                      </a:r>
+                      <a:r>
+                        <a:rPr lang="en-US" sz="1300" baseline="0"/>
+                        <a:t>dx,dy</a:t>
+                      </a:r>
+                      <a:r>
+                        <a:rPr lang="en-US" sz="1300" baseline="0" dirty="0"/>
+                        <a:t> translation; Yaw and  texture; </a:t>
+                      </a:r>
+                      <a:endParaRPr lang="en-US" sz="1300" dirty="0"/>
+                    </a:p>
+                  </a:txBody>
+                  <a:tcPr/>
+                </a:tc>
+                <a:tc>
+                  <a:txBody>
+                    <a:bodyPr/>
+                    <a:lstStyle/>
+                    <a:p>
+                      <a:pPr marL="0" marR="0" indent="0" algn="l" defTabSz="914400" rtl="0" eaLnBrk="1" fontAlgn="auto" latinLnBrk="0" hangingPunct="1">
+                        <a:lnSpc>
+                          <a:spcPct val="100000"/>
+                        </a:lnSpc>
+                        <a:spcBef>
+                          <a:spcPts val="0"/>
+                        </a:spcBef>
+                        <a:spcAft>
+                          <a:spcPts val="0"/>
+                        </a:spcAft>
+                        <a:buClrTx/>
+                        <a:buSzTx/>
+                        <a:buFontTx/>
+                        <a:buNone/>
+                        <a:tabLst/>
+                        <a:defRPr/>
+                      </a:pPr>
+                      <a:r>
+                        <a:rPr lang="en-US" sz="1300" dirty="0"/>
+                        <a:t>1. P.C. Plane fit </a:t>
+                      </a:r>
+                    </a:p>
+                    <a:p>
+                      <a:r>
+                        <a:rPr lang="en-US" sz="1300" dirty="0"/>
+                        <a:t>2. RealSense texture</a:t>
+                      </a:r>
+                    </a:p>
+                    <a:p>
+                      <a:r>
+                        <a:rPr lang="en-US" sz="1300" dirty="0"/>
+                        <a:t>3. IMU</a:t>
+                      </a:r>
+                      <a:r>
+                        <a:rPr lang="en-US" sz="1300" baseline="0" dirty="0"/>
+                        <a:t> yaw</a:t>
+                      </a:r>
+                    </a:p>
+                    <a:p>
+                      <a:r>
+                        <a:rPr lang="en-US" sz="1300" baseline="0" dirty="0"/>
+                        <a:t>4. Translation filter</a:t>
+                      </a:r>
+                      <a:endParaRPr lang="en-US" sz="1300" dirty="0"/>
+                    </a:p>
+                  </a:txBody>
+                  <a:tcPr/>
+                </a:tc>
+                <a:tc>
+                  <a:txBody>
+                    <a:bodyPr/>
+                    <a:lstStyle/>
+                    <a:p>
+                      <a:r>
+                        <a:rPr lang="en-US" sz="1300" dirty="0"/>
+                        <a:t>Scan matching</a:t>
+                      </a:r>
+                    </a:p>
+                  </a:txBody>
+                  <a:tcPr/>
+                </a:tc>
+                <a:extLst>
+                  <a:ext uri="{0D108BD9-81ED-4DB2-BD59-A6C34878D82A}">
+                    <a16:rowId xmlns:a16="http://schemas.microsoft.com/office/drawing/2014/main" val="1616977776"/>
+                  </a:ext>
+                </a:extLst>
+              </a:tr>
+              <a:tr h="370840">
+                <a:tc>
+                  <a:txBody>
+                    <a:bodyPr/>
+                    <a:lstStyle/>
+                    <a:p>
+                      <a:endParaRPr lang="en-US" sz="1300"/>
+                    </a:p>
+                  </a:txBody>
+                  <a:tcPr/>
+                </a:tc>
+                <a:tc>
+                  <a:txBody>
+                    <a:bodyPr/>
+                    <a:lstStyle/>
+                    <a:p>
+                      <a:r>
+                        <a:rPr lang="en-US" sz="1300" baseline="0" dirty="0"/>
+                        <a:t>Measure the  width along the 50m route on the S.W. and compare it to that derived from the SLAM</a:t>
+                      </a:r>
+                      <a:endParaRPr lang="en-US" sz="1300" dirty="0"/>
+                    </a:p>
+                  </a:txBody>
+                  <a:tcPr/>
+                </a:tc>
+                <a:tc>
+                  <a:txBody>
+                    <a:bodyPr/>
+                    <a:lstStyle/>
+                    <a:p>
+                      <a:r>
+                        <a:rPr lang="en-US" sz="1300" dirty="0"/>
+                        <a:t>Control </a:t>
+                      </a:r>
+                    </a:p>
+                  </a:txBody>
+                  <a:tcPr/>
+                </a:tc>
+                <a:tc>
+                  <a:txBody>
+                    <a:bodyPr/>
+                    <a:lstStyle/>
+                    <a:p>
+                      <a:r>
+                        <a:rPr lang="en-US" sz="1300" dirty="0"/>
+                        <a:t>SLAM</a:t>
+                      </a:r>
+                    </a:p>
+                  </a:txBody>
+                  <a:tcPr/>
+                </a:tc>
+                <a:tc>
+                  <a:txBody>
+                    <a:bodyPr/>
+                    <a:lstStyle/>
+                    <a:p>
+                      <a:r>
+                        <a:rPr lang="en-US" sz="1300" dirty="0"/>
+                        <a:t>Translations and yaw(</a:t>
+                      </a:r>
+                      <a:r>
+                        <a:rPr lang="en-US" sz="1300" dirty="0" err="1"/>
+                        <a:t>tx</a:t>
+                      </a:r>
+                      <a:r>
+                        <a:rPr lang="en-US" sz="1300" dirty="0"/>
+                        <a:t> and yaw),</a:t>
+                      </a:r>
+                      <a:endParaRPr lang="en-US" sz="1300" baseline="0" dirty="0"/>
+                    </a:p>
+                    <a:p>
+                      <a:r>
+                        <a:rPr lang="en-US" sz="1300" dirty="0"/>
+                        <a:t>D-frames – ground levels (plus/minus)</a:t>
+                      </a:r>
+                      <a:br>
+                        <a:rPr lang="en-US" sz="1300" dirty="0"/>
+                      </a:br>
+                      <a:r>
+                        <a:rPr lang="en-US" sz="1300" dirty="0"/>
+                        <a:t> SLAM frames – </a:t>
+                      </a:r>
+                      <a:r>
+                        <a:rPr lang="en-US" sz="1300" dirty="0" err="1"/>
+                        <a:t>xplus</a:t>
+                      </a:r>
+                      <a:r>
+                        <a:rPr lang="en-US" sz="1300" dirty="0"/>
+                        <a:t>/minus</a:t>
+                      </a:r>
+                    </a:p>
+                  </a:txBody>
+                  <a:tcPr/>
+                </a:tc>
+                <a:tc>
+                  <a:txBody>
+                    <a:bodyPr/>
+                    <a:lstStyle/>
+                    <a:p>
+                      <a:r>
+                        <a:rPr lang="en-US" sz="1300" dirty="0"/>
+                        <a:t>Scan matching</a:t>
+                      </a:r>
+                    </a:p>
+                  </a:txBody>
+                  <a:tcPr/>
+                </a:tc>
+                <a:tc>
+                  <a:txBody>
+                    <a:bodyPr/>
+                    <a:lstStyle/>
+                    <a:p>
+                      <a:r>
+                        <a:rPr lang="en-US" sz="1300" dirty="0"/>
+                        <a:t>SLAM</a:t>
+                      </a:r>
+                    </a:p>
+                  </a:txBody>
+                  <a:tcPr/>
+                </a:tc>
+                <a:extLst>
+                  <a:ext uri="{0D108BD9-81ED-4DB2-BD59-A6C34878D82A}">
+                    <a16:rowId xmlns:a16="http://schemas.microsoft.com/office/drawing/2014/main" val="1600335779"/>
+                  </a:ext>
+                </a:extLst>
+              </a:tr>
+              <a:tr h="370840">
+                <a:tc>
+                  <a:txBody>
+                    <a:bodyPr/>
+                    <a:lstStyle/>
+                    <a:p>
+                      <a:endParaRPr lang="en-US" sz="1300"/>
+                    </a:p>
+                  </a:txBody>
+                  <a:tcPr/>
+                </a:tc>
+                <a:tc>
+                  <a:txBody>
+                    <a:bodyPr/>
+                    <a:lstStyle/>
+                    <a:p>
+                      <a:endParaRPr lang="en-US" sz="1300" dirty="0"/>
+                    </a:p>
+                  </a:txBody>
+                  <a:tcPr/>
+                </a:tc>
+                <a:tc>
+                  <a:txBody>
+                    <a:bodyPr/>
+                    <a:lstStyle/>
+                    <a:p>
+                      <a:r>
+                        <a:rPr lang="en-US" sz="1300" dirty="0"/>
+                        <a:t>User feedback</a:t>
+                      </a:r>
+                    </a:p>
+                  </a:txBody>
+                  <a:tcPr/>
+                </a:tc>
+                <a:tc>
+                  <a:txBody>
+                    <a:bodyPr/>
+                    <a:lstStyle/>
+                    <a:p>
+                      <a:r>
+                        <a:rPr lang="en-US" sz="1300" dirty="0"/>
+                        <a:t>Vibration control </a:t>
+                      </a:r>
+                    </a:p>
+                  </a:txBody>
+                  <a:tcPr/>
+                </a:tc>
+                <a:tc>
+                  <a:txBody>
+                    <a:bodyPr/>
+                    <a:lstStyle/>
+                    <a:p>
+                      <a:r>
+                        <a:rPr lang="en-US" sz="1300" dirty="0"/>
+                        <a:t>SLAM</a:t>
+                      </a:r>
+                    </a:p>
+                  </a:txBody>
+                  <a:tcPr/>
+                </a:tc>
+                <a:tc>
+                  <a:txBody>
+                    <a:bodyPr/>
+                    <a:lstStyle/>
+                    <a:p>
+                      <a:r>
+                        <a:rPr lang="en-US" sz="1300" dirty="0"/>
+                        <a:t>SLAM</a:t>
+                      </a:r>
+                    </a:p>
+                  </a:txBody>
+                  <a:tcPr/>
+                </a:tc>
+                <a:tc>
+                  <a:txBody>
+                    <a:bodyPr/>
+                    <a:lstStyle/>
+                    <a:p>
+                      <a:r>
+                        <a:rPr lang="en-US" sz="1300" dirty="0"/>
+                        <a:t>Control</a:t>
+                      </a:r>
+                    </a:p>
+                  </a:txBody>
+                  <a:tcPr/>
+                </a:tc>
+                <a:extLst>
+                  <a:ext uri="{0D108BD9-81ED-4DB2-BD59-A6C34878D82A}">
+                    <a16:rowId xmlns:a16="http://schemas.microsoft.com/office/drawing/2014/main" val="4139309466"/>
+                  </a:ext>
+                </a:extLst>
+              </a:tr>
+              <a:tr h="370840">
+                <a:tc>
+                  <a:txBody>
+                    <a:bodyPr/>
+                    <a:lstStyle/>
+                    <a:p>
+                      <a:endParaRPr lang="en-US" sz="1300"/>
+                    </a:p>
+                  </a:txBody>
+                  <a:tcPr/>
+                </a:tc>
+                <a:tc>
+                  <a:txBody>
+                    <a:bodyPr/>
+                    <a:lstStyle/>
+                    <a:p>
+                      <a:endParaRPr lang="en-US" sz="1300" dirty="0"/>
+                    </a:p>
+                  </a:txBody>
+                  <a:tcPr/>
+                </a:tc>
+                <a:tc>
+                  <a:txBody>
+                    <a:bodyPr/>
+                    <a:lstStyle/>
+                    <a:p>
+                      <a:r>
+                        <a:rPr lang="en-US" sz="1300" dirty="0"/>
+                        <a:t>NA</a:t>
+                      </a:r>
+                    </a:p>
+                  </a:txBody>
+                  <a:tcPr/>
+                </a:tc>
+                <a:tc>
+                  <a:txBody>
+                    <a:bodyPr/>
+                    <a:lstStyle/>
+                    <a:p>
+                      <a:r>
+                        <a:rPr lang="en-US" sz="1300" dirty="0"/>
+                        <a:t>Activating # motor 1/ 2/ 3</a:t>
+                      </a:r>
+                    </a:p>
+                  </a:txBody>
+                  <a:tcPr/>
+                </a:tc>
+                <a:tc>
+                  <a:txBody>
+                    <a:bodyPr/>
+                    <a:lstStyle/>
+                    <a:p>
+                      <a:r>
+                        <a:rPr lang="en-US" sz="1300" dirty="0"/>
+                        <a:t>Activating motor # 1/ 2/ 3</a:t>
+                      </a:r>
+                    </a:p>
+                  </a:txBody>
+                  <a:tcPr/>
+                </a:tc>
+                <a:tc>
+                  <a:txBody>
+                    <a:bodyPr/>
+                    <a:lstStyle/>
+                    <a:p>
+                      <a:r>
+                        <a:rPr lang="en-US" sz="1300" dirty="0"/>
+                        <a:t>Control</a:t>
+                      </a:r>
+                    </a:p>
+                  </a:txBody>
+                  <a:tcPr/>
+                </a:tc>
+                <a:tc>
+                  <a:txBody>
+                    <a:bodyPr/>
+                    <a:lstStyle/>
+                    <a:p>
+                      <a:r>
+                        <a:rPr lang="en-US" sz="1300" dirty="0"/>
+                        <a:t>User feedback</a:t>
+                      </a:r>
+                    </a:p>
+                  </a:txBody>
+                  <a:tcPr/>
+                </a:tc>
+                <a:extLst>
+                  <a:ext uri="{0D108BD9-81ED-4DB2-BD59-A6C34878D82A}">
+                    <a16:rowId xmlns:a16="http://schemas.microsoft.com/office/drawing/2014/main" val="3162205224"/>
+                  </a:ext>
+                </a:extLst>
+              </a:tr>
+            </a:tbl>
+          </a:graphicData>
+        </a:graphic>
+      </p:graphicFrame>
+    </p:spTree>
+    <p:extLst>
+      <p:ext uri="{BB962C8B-B14F-4D97-AF65-F5344CB8AC3E}">
+        <p14:creationId xmlns:p14="http://schemas.microsoft.com/office/powerpoint/2010/main" val="2438966983"/>
+      </p:ext>
+    </p:extLst>
+  </p:cSld>
+  <p:clrMapOvr>
+    <a:masterClrMapping/>
+  </p:clrMapOvr>
+</p:sld>
+</file>
+
+<file path=ppt/slides/slide5.xml><?xml version="1.0" encoding="utf-8"?>
+<p:sld xmlns:a="http://schemas.openxmlformats.org/drawingml/2006/main" xmlns:r="http://schemas.openxmlformats.org/officeDocument/2006/relationships" xmlns:p="http://schemas.openxmlformats.org/presentationml/2006/main">
+  <p:cSld>
+    <p:spTree>
+      <p:nvGrpSpPr>
+        <p:cNvPr id="1" name=""/>
+        <p:cNvGrpSpPr/>
+        <p:nvPr/>
+      </p:nvGrpSpPr>
+      <p:grpSpPr>
+        <a:xfrm>
+          <a:off x="0" y="0"/>
+          <a:ext cx="0" cy="0"/>
+          <a:chOff x="0" y="0"/>
+          <a:chExt cx="0" cy="0"/>
+        </a:xfrm>
+      </p:grpSpPr>
+      <p:sp>
+        <p:nvSpPr>
+          <p:cNvPr id="2" name="Title 1">
+            <a:extLst>
+              <a:ext uri="{FF2B5EF4-FFF2-40B4-BE49-F238E27FC236}">
+                <a16:creationId xmlns:a16="http://schemas.microsoft.com/office/drawing/2014/main" id="{AD5C1F1C-BE7C-4A0A-B872-9AA00DF50EDA}"/>
+              </a:ext>
+            </a:extLst>
+          </p:cNvPr>
+          <p:cNvSpPr>
+            <a:spLocks noGrp="1"/>
+          </p:cNvSpPr>
+          <p:nvPr>
+            <p:ph type="title"/>
+          </p:nvPr>
+        </p:nvSpPr>
+        <p:spPr/>
+        <p:txBody>
+          <a:bodyPr/>
+          <a:lstStyle/>
+          <a:p>
+            <a:endParaRPr lang="en-IL"/>
+          </a:p>
+        </p:txBody>
+      </p:sp>
+      <p:sp>
+        <p:nvSpPr>
+          <p:cNvPr id="3" name="Content Placeholder 2">
+            <a:extLst>
+              <a:ext uri="{FF2B5EF4-FFF2-40B4-BE49-F238E27FC236}">
+                <a16:creationId xmlns:a16="http://schemas.microsoft.com/office/drawing/2014/main" id="{3333B0AB-8904-42BB-B2FD-7F1512B97353}"/>
+              </a:ext>
+            </a:extLst>
+          </p:cNvPr>
+          <p:cNvSpPr>
+            <a:spLocks noGrp="1"/>
+          </p:cNvSpPr>
+          <p:nvPr>
+            <p:ph idx="1"/>
+          </p:nvPr>
+        </p:nvSpPr>
+        <p:spPr/>
+        <p:txBody>
+          <a:bodyPr/>
+          <a:lstStyle/>
+          <a:p>
+            <a:endParaRPr lang="en-IL" dirty="0"/>
+          </a:p>
+        </p:txBody>
+      </p:sp>
+      <p:cxnSp>
+        <p:nvCxnSpPr>
+          <p:cNvPr id="5" name="Straight Arrow Connector 4">
+            <a:extLst>
+              <a:ext uri="{FF2B5EF4-FFF2-40B4-BE49-F238E27FC236}">
+                <a16:creationId xmlns:a16="http://schemas.microsoft.com/office/drawing/2014/main" id="{E454DF7B-25B3-4757-9C20-D115334B0E57}"/>
+              </a:ext>
+            </a:extLst>
+          </p:cNvPr>
+          <p:cNvCxnSpPr/>
+          <p:nvPr/>
+        </p:nvCxnSpPr>
+        <p:spPr>
+          <a:xfrm>
+            <a:off x="1895912" y="4102217"/>
+            <a:ext cx="7894040" cy="0"/>
+          </a:xfrm>
+          <a:prstGeom prst="straightConnector1">
+            <a:avLst/>
+          </a:prstGeom>
+          <a:ln>
+            <a:tailEnd type="triangle"/>
+          </a:ln>
+        </p:spPr>
+        <p:style>
+          <a:lnRef idx="1">
+            <a:schemeClr val="accent6"/>
+          </a:lnRef>
+          <a:fillRef idx="0">
+            <a:schemeClr val="accent6"/>
+          </a:fillRef>
+          <a:effectRef idx="0">
+            <a:schemeClr val="accent6"/>
+          </a:effectRef>
+          <a:fontRef idx="minor">
+            <a:schemeClr val="tx1"/>
+          </a:fontRef>
+        </p:style>
+      </p:cxnSp>
+      <p:cxnSp>
+        <p:nvCxnSpPr>
+          <p:cNvPr id="7" name="Straight Arrow Connector 6">
+            <a:extLst>
+              <a:ext uri="{FF2B5EF4-FFF2-40B4-BE49-F238E27FC236}">
+                <a16:creationId xmlns:a16="http://schemas.microsoft.com/office/drawing/2014/main" id="{199B9E48-9E96-4F32-9ECB-AB9DAA2C3307}"/>
+              </a:ext>
+            </a:extLst>
+          </p:cNvPr>
+          <p:cNvCxnSpPr/>
+          <p:nvPr/>
+        </p:nvCxnSpPr>
+        <p:spPr>
+          <a:xfrm flipV="1">
+            <a:off x="2402048" y="3429000"/>
+            <a:ext cx="7894040" cy="1260446"/>
+          </a:xfrm>
+          <a:prstGeom prst="straightConnector1">
+            <a:avLst/>
+          </a:prstGeom>
+          <a:ln>
+            <a:tailEnd type="triangle"/>
+          </a:ln>
+        </p:spPr>
+        <p:style>
+          <a:lnRef idx="1">
+            <a:schemeClr val="accent1"/>
+          </a:lnRef>
+          <a:fillRef idx="0">
+            <a:schemeClr val="accent1"/>
+          </a:fillRef>
+          <a:effectRef idx="0">
+            <a:schemeClr val="accent1"/>
+          </a:effectRef>
+          <a:fontRef idx="minor">
+            <a:schemeClr val="tx1"/>
+          </a:fontRef>
+        </p:style>
+      </p:cxnSp>
+      <p:sp>
+        <p:nvSpPr>
+          <p:cNvPr id="8" name="Rectangle 7">
+            <a:extLst>
+              <a:ext uri="{FF2B5EF4-FFF2-40B4-BE49-F238E27FC236}">
+                <a16:creationId xmlns:a16="http://schemas.microsoft.com/office/drawing/2014/main" id="{956D7B96-CEDC-409D-B487-03EEE500C988}"/>
+              </a:ext>
+            </a:extLst>
+          </p:cNvPr>
+          <p:cNvSpPr/>
+          <p:nvPr/>
+        </p:nvSpPr>
+        <p:spPr>
+          <a:xfrm>
+            <a:off x="4773336" y="3187817"/>
+            <a:ext cx="2852257" cy="1661016"/>
+          </a:xfrm>
+          <a:prstGeom prst="rect">
+            <a:avLst/>
+          </a:prstGeom>
+          <a:noFill/>
+        </p:spPr>
+        <p:style>
+          <a:lnRef idx="2">
+            <a:schemeClr val="accent1">
+              <a:shade val="50000"/>
+            </a:schemeClr>
+          </a:lnRef>
+          <a:fillRef idx="1">
+            <a:schemeClr val="accent1"/>
+          </a:fillRef>
+          <a:effectRef idx="0">
+            <a:schemeClr val="accent1"/>
+          </a:effectRef>
+          <a:fontRef idx="minor">
+            <a:schemeClr val="lt1"/>
+          </a:fontRef>
+        </p:style>
+        <p:txBody>
+          <a:bodyPr rtlCol="0" anchor="ctr"/>
+          <a:lstStyle/>
+          <a:p>
+            <a:pPr algn="ctr"/>
+            <a:endParaRPr lang="en-IL"/>
+          </a:p>
+        </p:txBody>
+      </p:sp>
+      <p:sp>
+        <p:nvSpPr>
+          <p:cNvPr id="9" name="Rectangle 8">
+            <a:extLst>
+              <a:ext uri="{FF2B5EF4-FFF2-40B4-BE49-F238E27FC236}">
+                <a16:creationId xmlns:a16="http://schemas.microsoft.com/office/drawing/2014/main" id="{DB992E66-8561-4663-98BA-E378280656EE}"/>
+              </a:ext>
+            </a:extLst>
+          </p:cNvPr>
+          <p:cNvSpPr/>
+          <p:nvPr/>
+        </p:nvSpPr>
+        <p:spPr>
+          <a:xfrm>
+            <a:off x="3402435" y="2721528"/>
+            <a:ext cx="5554910" cy="2593593"/>
+          </a:xfrm>
+          <a:prstGeom prst="rect">
+            <a:avLst/>
+          </a:prstGeom>
+          <a:noFill/>
+        </p:spPr>
+        <p:style>
+          <a:lnRef idx="2">
+            <a:schemeClr val="accent1">
+              <a:shade val="50000"/>
+            </a:schemeClr>
+          </a:lnRef>
+          <a:fillRef idx="1">
+            <a:schemeClr val="accent1"/>
+          </a:fillRef>
+          <a:effectRef idx="0">
+            <a:schemeClr val="accent1"/>
+          </a:effectRef>
+          <a:fontRef idx="minor">
+            <a:schemeClr val="lt1"/>
+          </a:fontRef>
+        </p:style>
+        <p:txBody>
+          <a:bodyPr rtlCol="0" anchor="ctr"/>
+          <a:lstStyle/>
+          <a:p>
+            <a:pPr algn="ctr"/>
+            <a:endParaRPr lang="en-IL"/>
+          </a:p>
+        </p:txBody>
+      </p:sp>
+    </p:spTree>
+    <p:extLst>
+      <p:ext uri="{BB962C8B-B14F-4D97-AF65-F5344CB8AC3E}">
+        <p14:creationId xmlns:p14="http://schemas.microsoft.com/office/powerpoint/2010/main" val="2539395696"/>
+      </p:ext>
+    </p:extLst>
+  </p:cSld>
+  <p:clrMapOvr>
+    <a:masterClrMapping/>
+  </p:clrMapOvr>
+</p:sld>
+</file>
+
+<file path=ppt/slides/slide6.xml><?xml version="1.0" encoding="utf-8"?>
+<p:sld xmlns:a="http://schemas.openxmlformats.org/drawingml/2006/main" xmlns:r="http://schemas.openxmlformats.org/officeDocument/2006/relationships" xmlns:p="http://schemas.openxmlformats.org/presentationml/2006/main">
+  <p:cSld>
+    <p:spTree>
+      <p:nvGrpSpPr>
+        <p:cNvPr id="1" name=""/>
+        <p:cNvGrpSpPr/>
+        <p:nvPr/>
+      </p:nvGrpSpPr>
+      <p:grpSpPr>
+        <a:xfrm>
+          <a:off x="0" y="0"/>
+          <a:ext cx="0" cy="0"/>
+          <a:chOff x="0" y="0"/>
+          <a:chExt cx="0" cy="0"/>
+        </a:xfrm>
+      </p:grpSpPr>
+      <p:sp>
+        <p:nvSpPr>
+          <p:cNvPr id="2" name="Title 1">
+            <a:extLst>
+              <a:ext uri="{FF2B5EF4-FFF2-40B4-BE49-F238E27FC236}">
+                <a16:creationId xmlns:a16="http://schemas.microsoft.com/office/drawing/2014/main" id="{CB6D59E2-4424-424E-A03D-2E4E4BF0E5B5}"/>
+              </a:ext>
+            </a:extLst>
+          </p:cNvPr>
+          <p:cNvSpPr>
+            <a:spLocks noGrp="1"/>
+          </p:cNvSpPr>
+          <p:nvPr>
+            <p:ph type="title"/>
+          </p:nvPr>
+        </p:nvSpPr>
+        <p:spPr/>
+        <p:txBody>
+          <a:bodyPr/>
+          <a:lstStyle/>
+          <a:p>
+            <a:endParaRPr lang="en-IL"/>
+          </a:p>
+        </p:txBody>
+      </p:sp>
+      <p:sp>
+        <p:nvSpPr>
+          <p:cNvPr id="3" name="Content Placeholder 2">
+            <a:extLst>
+              <a:ext uri="{FF2B5EF4-FFF2-40B4-BE49-F238E27FC236}">
+                <a16:creationId xmlns:a16="http://schemas.microsoft.com/office/drawing/2014/main" id="{92C1123D-9E15-410B-A806-CC8169D4BF2A}"/>
+              </a:ext>
+            </a:extLst>
+          </p:cNvPr>
+          <p:cNvSpPr>
+            <a:spLocks noGrp="1"/>
+          </p:cNvSpPr>
+          <p:nvPr>
+            <p:ph idx="1"/>
+          </p:nvPr>
+        </p:nvSpPr>
+        <p:spPr/>
+        <p:txBody>
+          <a:bodyPr/>
+          <a:lstStyle/>
+          <a:p>
+            <a:endParaRPr lang="en-IL"/>
+          </a:p>
+        </p:txBody>
+      </p:sp>
+      <p:sp>
+        <p:nvSpPr>
+          <p:cNvPr id="4" name="Freeform: Shape 3">
+            <a:extLst>
+              <a:ext uri="{FF2B5EF4-FFF2-40B4-BE49-F238E27FC236}">
+                <a16:creationId xmlns:a16="http://schemas.microsoft.com/office/drawing/2014/main" id="{EAF4D0AB-9B9E-4898-BE2F-EFDB8A849057}"/>
+              </a:ext>
+            </a:extLst>
+          </p:cNvPr>
+          <p:cNvSpPr/>
+          <p:nvPr/>
+        </p:nvSpPr>
+        <p:spPr>
+          <a:xfrm>
+            <a:off x="1535185" y="2919352"/>
+            <a:ext cx="9269835" cy="1057030"/>
+          </a:xfrm>
+          <a:custGeom>
+            <a:avLst/>
+            <a:gdLst>
+              <a:gd name="connsiteX0" fmla="*/ 0 w 9269835"/>
+              <a:gd name="connsiteY0" fmla="*/ 1057030 h 1057030"/>
+              <a:gd name="connsiteX1" fmla="*/ 58723 w 9269835"/>
+              <a:gd name="connsiteY1" fmla="*/ 1040252 h 1057030"/>
+              <a:gd name="connsiteX2" fmla="*/ 444617 w 9269835"/>
+              <a:gd name="connsiteY2" fmla="*/ 998307 h 1057030"/>
+              <a:gd name="connsiteX3" fmla="*/ 763398 w 9269835"/>
+              <a:gd name="connsiteY3" fmla="*/ 981529 h 1057030"/>
+              <a:gd name="connsiteX4" fmla="*/ 1719743 w 9269835"/>
+              <a:gd name="connsiteY4" fmla="*/ 947973 h 1057030"/>
+              <a:gd name="connsiteX5" fmla="*/ 1946246 w 9269835"/>
+              <a:gd name="connsiteY5" fmla="*/ 931195 h 1057030"/>
+              <a:gd name="connsiteX6" fmla="*/ 2239861 w 9269835"/>
+              <a:gd name="connsiteY6" fmla="*/ 922806 h 1057030"/>
+              <a:gd name="connsiteX7" fmla="*/ 2390863 w 9269835"/>
+              <a:gd name="connsiteY7" fmla="*/ 906028 h 1057030"/>
+              <a:gd name="connsiteX8" fmla="*/ 2818701 w 9269835"/>
+              <a:gd name="connsiteY8" fmla="*/ 864083 h 1057030"/>
+              <a:gd name="connsiteX9" fmla="*/ 3045204 w 9269835"/>
+              <a:gd name="connsiteY9" fmla="*/ 830527 h 1057030"/>
+              <a:gd name="connsiteX10" fmla="*/ 3296874 w 9269835"/>
+              <a:gd name="connsiteY10" fmla="*/ 771804 h 1057030"/>
+              <a:gd name="connsiteX11" fmla="*/ 3372375 w 9269835"/>
+              <a:gd name="connsiteY11" fmla="*/ 738248 h 1057030"/>
+              <a:gd name="connsiteX12" fmla="*/ 3624044 w 9269835"/>
+              <a:gd name="connsiteY12" fmla="*/ 671136 h 1057030"/>
+              <a:gd name="connsiteX13" fmla="*/ 3665989 w 9269835"/>
+              <a:gd name="connsiteY13" fmla="*/ 654358 h 1057030"/>
+              <a:gd name="connsiteX14" fmla="*/ 3699545 w 9269835"/>
+              <a:gd name="connsiteY14" fmla="*/ 645969 h 1057030"/>
+              <a:gd name="connsiteX15" fmla="*/ 4186107 w 9269835"/>
+              <a:gd name="connsiteY15" fmla="*/ 469800 h 1057030"/>
+              <a:gd name="connsiteX16" fmla="*/ 4353887 w 9269835"/>
+              <a:gd name="connsiteY16" fmla="*/ 419466 h 1057030"/>
+              <a:gd name="connsiteX17" fmla="*/ 4580389 w 9269835"/>
+              <a:gd name="connsiteY17" fmla="*/ 352354 h 1057030"/>
+              <a:gd name="connsiteX18" fmla="*/ 4999839 w 9269835"/>
+              <a:gd name="connsiteY18" fmla="*/ 243298 h 1057030"/>
+              <a:gd name="connsiteX19" fmla="*/ 5268287 w 9269835"/>
+              <a:gd name="connsiteY19" fmla="*/ 218131 h 1057030"/>
+              <a:gd name="connsiteX20" fmla="*/ 5612235 w 9269835"/>
+              <a:gd name="connsiteY20" fmla="*/ 226520 h 1057030"/>
+              <a:gd name="connsiteX21" fmla="*/ 5729681 w 9269835"/>
+              <a:gd name="connsiteY21" fmla="*/ 243298 h 1057030"/>
+              <a:gd name="connsiteX22" fmla="*/ 5981351 w 9269835"/>
+              <a:gd name="connsiteY22" fmla="*/ 268465 h 1057030"/>
+              <a:gd name="connsiteX23" fmla="*/ 6367244 w 9269835"/>
+              <a:gd name="connsiteY23" fmla="*/ 327187 h 1057030"/>
+              <a:gd name="connsiteX24" fmla="*/ 7164198 w 9269835"/>
+              <a:gd name="connsiteY24" fmla="*/ 318798 h 1057030"/>
+              <a:gd name="connsiteX25" fmla="*/ 7466202 w 9269835"/>
+              <a:gd name="connsiteY25" fmla="*/ 276854 h 1057030"/>
+              <a:gd name="connsiteX26" fmla="*/ 7575259 w 9269835"/>
+              <a:gd name="connsiteY26" fmla="*/ 268465 h 1057030"/>
+              <a:gd name="connsiteX27" fmla="*/ 7852096 w 9269835"/>
+              <a:gd name="connsiteY27" fmla="*/ 243298 h 1057030"/>
+              <a:gd name="connsiteX28" fmla="*/ 7961153 w 9269835"/>
+              <a:gd name="connsiteY28" fmla="*/ 226520 h 1057030"/>
+              <a:gd name="connsiteX29" fmla="*/ 8506437 w 9269835"/>
+              <a:gd name="connsiteY29" fmla="*/ 176186 h 1057030"/>
+              <a:gd name="connsiteX30" fmla="*/ 9034943 w 9269835"/>
+              <a:gd name="connsiteY30" fmla="*/ 50351 h 1057030"/>
+              <a:gd name="connsiteX31" fmla="*/ 9177556 w 9269835"/>
+              <a:gd name="connsiteY31" fmla="*/ 16795 h 1057030"/>
+              <a:gd name="connsiteX32" fmla="*/ 9269835 w 9269835"/>
+              <a:gd name="connsiteY32" fmla="*/ 17 h 1057030"/>
+            </a:gdLst>
+            <a:ahLst/>
+            <a:cxnLst>
+              <a:cxn ang="0">
+                <a:pos x="connsiteX0" y="connsiteY0"/>
+              </a:cxn>
+              <a:cxn ang="0">
+                <a:pos x="connsiteX1" y="connsiteY1"/>
+              </a:cxn>
+              <a:cxn ang="0">
+                <a:pos x="connsiteX2" y="connsiteY2"/>
+              </a:cxn>
+              <a:cxn ang="0">
+                <a:pos x="connsiteX3" y="connsiteY3"/>
+              </a:cxn>
+              <a:cxn ang="0">
+                <a:pos x="connsiteX4" y="connsiteY4"/>
+              </a:cxn>
+              <a:cxn ang="0">
+                <a:pos x="connsiteX5" y="connsiteY5"/>
+              </a:cxn>
+              <a:cxn ang="0">
+                <a:pos x="connsiteX6" y="connsiteY6"/>
+              </a:cxn>
+              <a:cxn ang="0">
+                <a:pos x="connsiteX7" y="connsiteY7"/>
+              </a:cxn>
+              <a:cxn ang="0">
+                <a:pos x="connsiteX8" y="connsiteY8"/>
+              </a:cxn>
+              <a:cxn ang="0">
+                <a:pos x="connsiteX9" y="connsiteY9"/>
+              </a:cxn>
+              <a:cxn ang="0">
+                <a:pos x="connsiteX10" y="connsiteY10"/>
+              </a:cxn>
+              <a:cxn ang="0">
+                <a:pos x="connsiteX11" y="connsiteY11"/>
+              </a:cxn>
+              <a:cxn ang="0">
+                <a:pos x="connsiteX12" y="connsiteY12"/>
+              </a:cxn>
+              <a:cxn ang="0">
+                <a:pos x="connsiteX13" y="connsiteY13"/>
+              </a:cxn>
+              <a:cxn ang="0">
+                <a:pos x="connsiteX14" y="connsiteY14"/>
+              </a:cxn>
+              <a:cxn ang="0">
+                <a:pos x="connsiteX15" y="connsiteY15"/>
+              </a:cxn>
+              <a:cxn ang="0">
+                <a:pos x="connsiteX16" y="connsiteY16"/>
+              </a:cxn>
+              <a:cxn ang="0">
+                <a:pos x="connsiteX17" y="connsiteY17"/>
+              </a:cxn>
+              <a:cxn ang="0">
+                <a:pos x="connsiteX18" y="connsiteY18"/>
+              </a:cxn>
+              <a:cxn ang="0">
+                <a:pos x="connsiteX19" y="connsiteY19"/>
+              </a:cxn>
+              <a:cxn ang="0">
+                <a:pos x="connsiteX20" y="connsiteY20"/>
+              </a:cxn>
+              <a:cxn ang="0">
+                <a:pos x="connsiteX21" y="connsiteY21"/>
+              </a:cxn>
+              <a:cxn ang="0">
+                <a:pos x="connsiteX22" y="connsiteY22"/>
+              </a:cxn>
+              <a:cxn ang="0">
+                <a:pos x="connsiteX23" y="connsiteY23"/>
+              </a:cxn>
+              <a:cxn ang="0">
+                <a:pos x="connsiteX24" y="connsiteY24"/>
+              </a:cxn>
+              <a:cxn ang="0">
+                <a:pos x="connsiteX25" y="connsiteY25"/>
+              </a:cxn>
+              <a:cxn ang="0">
+                <a:pos x="connsiteX26" y="connsiteY26"/>
+              </a:cxn>
+              <a:cxn ang="0">
+                <a:pos x="connsiteX27" y="connsiteY27"/>
+              </a:cxn>
+              <a:cxn ang="0">
+                <a:pos x="connsiteX28" y="connsiteY28"/>
+              </a:cxn>
+              <a:cxn ang="0">
+                <a:pos x="connsiteX29" y="connsiteY29"/>
+              </a:cxn>
+              <a:cxn ang="0">
+                <a:pos x="connsiteX30" y="connsiteY30"/>
+              </a:cxn>
+              <a:cxn ang="0">
+                <a:pos x="connsiteX31" y="connsiteY31"/>
+              </a:cxn>
+              <a:cxn ang="0">
+                <a:pos x="connsiteX32" y="connsiteY32"/>
+              </a:cxn>
+            </a:cxnLst>
+            <a:rect l="l" t="t" r="r" b="b"/>
+            <a:pathLst>
+              <a:path w="9269835" h="1057030">
+                <a:moveTo>
+                  <a:pt x="0" y="1057030"/>
+                </a:moveTo>
+                <a:cubicBezTo>
+                  <a:pt x="19574" y="1051437"/>
+                  <a:pt x="38706" y="1043959"/>
+                  <a:pt x="58723" y="1040252"/>
+                </a:cubicBezTo>
+                <a:cubicBezTo>
+                  <a:pt x="232575" y="1008057"/>
+                  <a:pt x="255271" y="1014537"/>
+                  <a:pt x="444617" y="998307"/>
+                </a:cubicBezTo>
+                <a:cubicBezTo>
+                  <a:pt x="678169" y="978288"/>
+                  <a:pt x="246771" y="999344"/>
+                  <a:pt x="763398" y="981529"/>
+                </a:cubicBezTo>
+                <a:cubicBezTo>
+                  <a:pt x="1296519" y="926379"/>
+                  <a:pt x="769470" y="973427"/>
+                  <a:pt x="1719743" y="947973"/>
+                </a:cubicBezTo>
+                <a:cubicBezTo>
+                  <a:pt x="1795424" y="945946"/>
+                  <a:pt x="1870627" y="934854"/>
+                  <a:pt x="1946246" y="931195"/>
+                </a:cubicBezTo>
+                <a:cubicBezTo>
+                  <a:pt x="2044043" y="926463"/>
+                  <a:pt x="2141989" y="925602"/>
+                  <a:pt x="2239861" y="922806"/>
+                </a:cubicBezTo>
+                <a:lnTo>
+                  <a:pt x="2390863" y="906028"/>
+                </a:lnTo>
+                <a:cubicBezTo>
+                  <a:pt x="2696230" y="877753"/>
+                  <a:pt x="2608992" y="894041"/>
+                  <a:pt x="2818701" y="864083"/>
+                </a:cubicBezTo>
+                <a:cubicBezTo>
+                  <a:pt x="2894259" y="853289"/>
+                  <a:pt x="2970483" y="846094"/>
+                  <a:pt x="3045204" y="830527"/>
+                </a:cubicBezTo>
+                <a:cubicBezTo>
+                  <a:pt x="3405315" y="755504"/>
+                  <a:pt x="3094503" y="794290"/>
+                  <a:pt x="3296874" y="771804"/>
+                </a:cubicBezTo>
+                <a:cubicBezTo>
+                  <a:pt x="3322041" y="760619"/>
+                  <a:pt x="3346248" y="746957"/>
+                  <a:pt x="3372375" y="738248"/>
+                </a:cubicBezTo>
+                <a:cubicBezTo>
+                  <a:pt x="3552727" y="678130"/>
+                  <a:pt x="3475328" y="714876"/>
+                  <a:pt x="3624044" y="671136"/>
+                </a:cubicBezTo>
+                <a:cubicBezTo>
+                  <a:pt x="3638491" y="666887"/>
+                  <a:pt x="3651703" y="659120"/>
+                  <a:pt x="3665989" y="654358"/>
+                </a:cubicBezTo>
+                <a:cubicBezTo>
+                  <a:pt x="3676927" y="650712"/>
+                  <a:pt x="3688663" y="649778"/>
+                  <a:pt x="3699545" y="645969"/>
+                </a:cubicBezTo>
+                <a:cubicBezTo>
+                  <a:pt x="3902047" y="575093"/>
+                  <a:pt x="3915332" y="551032"/>
+                  <a:pt x="4186107" y="469800"/>
+                </a:cubicBezTo>
+                <a:cubicBezTo>
+                  <a:pt x="4242034" y="453022"/>
+                  <a:pt x="4298494" y="437930"/>
+                  <a:pt x="4353887" y="419466"/>
+                </a:cubicBezTo>
+                <a:cubicBezTo>
+                  <a:pt x="4562346" y="349979"/>
+                  <a:pt x="4411679" y="383029"/>
+                  <a:pt x="4580389" y="352354"/>
+                </a:cubicBezTo>
+                <a:cubicBezTo>
+                  <a:pt x="4746762" y="285805"/>
+                  <a:pt x="4726129" y="288916"/>
+                  <a:pt x="4999839" y="243298"/>
+                </a:cubicBezTo>
+                <a:cubicBezTo>
+                  <a:pt x="5088491" y="228523"/>
+                  <a:pt x="5178804" y="226520"/>
+                  <a:pt x="5268287" y="218131"/>
+                </a:cubicBezTo>
+                <a:cubicBezTo>
+                  <a:pt x="5382936" y="220927"/>
+                  <a:pt x="5497722" y="220274"/>
+                  <a:pt x="5612235" y="226520"/>
+                </a:cubicBezTo>
+                <a:cubicBezTo>
+                  <a:pt x="5651722" y="228674"/>
+                  <a:pt x="5690388" y="238833"/>
+                  <a:pt x="5729681" y="243298"/>
+                </a:cubicBezTo>
+                <a:cubicBezTo>
+                  <a:pt x="5813450" y="252817"/>
+                  <a:pt x="5897655" y="258320"/>
+                  <a:pt x="5981351" y="268465"/>
+                </a:cubicBezTo>
+                <a:cubicBezTo>
+                  <a:pt x="6237512" y="299514"/>
+                  <a:pt x="6204482" y="294635"/>
+                  <a:pt x="6367244" y="327187"/>
+                </a:cubicBezTo>
+                <a:lnTo>
+                  <a:pt x="7164198" y="318798"/>
+                </a:lnTo>
+                <a:cubicBezTo>
+                  <a:pt x="7272703" y="315917"/>
+                  <a:pt x="7359166" y="290665"/>
+                  <a:pt x="7466202" y="276854"/>
+                </a:cubicBezTo>
+                <a:cubicBezTo>
+                  <a:pt x="7502362" y="272188"/>
+                  <a:pt x="7538936" y="271623"/>
+                  <a:pt x="7575259" y="268465"/>
+                </a:cubicBezTo>
+                <a:lnTo>
+                  <a:pt x="7852096" y="243298"/>
+                </a:lnTo>
+                <a:cubicBezTo>
+                  <a:pt x="7888661" y="239324"/>
+                  <a:pt x="7924615" y="230736"/>
+                  <a:pt x="7961153" y="226520"/>
+                </a:cubicBezTo>
+                <a:cubicBezTo>
+                  <a:pt x="8227627" y="195773"/>
+                  <a:pt x="8267638" y="194555"/>
+                  <a:pt x="8506437" y="176186"/>
+                </a:cubicBezTo>
+                <a:cubicBezTo>
+                  <a:pt x="8815402" y="81120"/>
+                  <a:pt x="8340923" y="223856"/>
+                  <a:pt x="9034943" y="50351"/>
+                </a:cubicBezTo>
+                <a:cubicBezTo>
+                  <a:pt x="9223055" y="3323"/>
+                  <a:pt x="9071349" y="39554"/>
+                  <a:pt x="9177556" y="16795"/>
+                </a:cubicBezTo>
+                <a:cubicBezTo>
+                  <a:pt x="9261515" y="-1196"/>
+                  <a:pt x="9226626" y="17"/>
+                  <a:pt x="9269835" y="17"/>
+                </a:cubicBezTo>
+              </a:path>
+            </a:pathLst>
+          </a:custGeom>
+          <a:noFill/>
+        </p:spPr>
+        <p:style>
+          <a:lnRef idx="2">
+            <a:schemeClr val="accent1">
+              <a:shade val="50000"/>
+            </a:schemeClr>
+          </a:lnRef>
+          <a:fillRef idx="1">
+            <a:schemeClr val="accent1"/>
+          </a:fillRef>
+          <a:effectRef idx="0">
+            <a:schemeClr val="accent1"/>
+          </a:effectRef>
+          <a:fontRef idx="minor">
+            <a:schemeClr val="lt1"/>
+          </a:fontRef>
+        </p:style>
+        <p:txBody>
+          <a:bodyPr rtlCol="0" anchor="ctr"/>
+          <a:lstStyle/>
+          <a:p>
+            <a:pPr algn="ctr"/>
+            <a:endParaRPr lang="en-IL"/>
+          </a:p>
+        </p:txBody>
+      </p:sp>
+      <p:sp>
+        <p:nvSpPr>
+          <p:cNvPr id="5" name="Freeform: Shape 4">
+            <a:extLst>
+              <a:ext uri="{FF2B5EF4-FFF2-40B4-BE49-F238E27FC236}">
+                <a16:creationId xmlns:a16="http://schemas.microsoft.com/office/drawing/2014/main" id="{EC9BC37A-37E5-4292-ABF8-1DE86775318A}"/>
+              </a:ext>
+            </a:extLst>
+          </p:cNvPr>
+          <p:cNvSpPr/>
+          <p:nvPr/>
+        </p:nvSpPr>
+        <p:spPr>
+          <a:xfrm>
+            <a:off x="1386980" y="2900485"/>
+            <a:ext cx="9192936" cy="1057030"/>
+          </a:xfrm>
+          <a:custGeom>
+            <a:avLst/>
+            <a:gdLst>
+              <a:gd name="connsiteX0" fmla="*/ 0 w 9269835"/>
+              <a:gd name="connsiteY0" fmla="*/ 1057030 h 1057030"/>
+              <a:gd name="connsiteX1" fmla="*/ 58723 w 9269835"/>
+              <a:gd name="connsiteY1" fmla="*/ 1040252 h 1057030"/>
+              <a:gd name="connsiteX2" fmla="*/ 444617 w 9269835"/>
+              <a:gd name="connsiteY2" fmla="*/ 998307 h 1057030"/>
+              <a:gd name="connsiteX3" fmla="*/ 763398 w 9269835"/>
+              <a:gd name="connsiteY3" fmla="*/ 981529 h 1057030"/>
+              <a:gd name="connsiteX4" fmla="*/ 1719743 w 9269835"/>
+              <a:gd name="connsiteY4" fmla="*/ 947973 h 1057030"/>
+              <a:gd name="connsiteX5" fmla="*/ 1946246 w 9269835"/>
+              <a:gd name="connsiteY5" fmla="*/ 931195 h 1057030"/>
+              <a:gd name="connsiteX6" fmla="*/ 2239861 w 9269835"/>
+              <a:gd name="connsiteY6" fmla="*/ 922806 h 1057030"/>
+              <a:gd name="connsiteX7" fmla="*/ 2390863 w 9269835"/>
+              <a:gd name="connsiteY7" fmla="*/ 906028 h 1057030"/>
+              <a:gd name="connsiteX8" fmla="*/ 2818701 w 9269835"/>
+              <a:gd name="connsiteY8" fmla="*/ 864083 h 1057030"/>
+              <a:gd name="connsiteX9" fmla="*/ 3045204 w 9269835"/>
+              <a:gd name="connsiteY9" fmla="*/ 830527 h 1057030"/>
+              <a:gd name="connsiteX10" fmla="*/ 3296874 w 9269835"/>
+              <a:gd name="connsiteY10" fmla="*/ 771804 h 1057030"/>
+              <a:gd name="connsiteX11" fmla="*/ 3372375 w 9269835"/>
+              <a:gd name="connsiteY11" fmla="*/ 738248 h 1057030"/>
+              <a:gd name="connsiteX12" fmla="*/ 3624044 w 9269835"/>
+              <a:gd name="connsiteY12" fmla="*/ 671136 h 1057030"/>
+              <a:gd name="connsiteX13" fmla="*/ 3665989 w 9269835"/>
+              <a:gd name="connsiteY13" fmla="*/ 654358 h 1057030"/>
+              <a:gd name="connsiteX14" fmla="*/ 3699545 w 9269835"/>
+              <a:gd name="connsiteY14" fmla="*/ 645969 h 1057030"/>
+              <a:gd name="connsiteX15" fmla="*/ 4186107 w 9269835"/>
+              <a:gd name="connsiteY15" fmla="*/ 469800 h 1057030"/>
+              <a:gd name="connsiteX16" fmla="*/ 4353887 w 9269835"/>
+              <a:gd name="connsiteY16" fmla="*/ 419466 h 1057030"/>
+              <a:gd name="connsiteX17" fmla="*/ 4580389 w 9269835"/>
+              <a:gd name="connsiteY17" fmla="*/ 352354 h 1057030"/>
+              <a:gd name="connsiteX18" fmla="*/ 4999839 w 9269835"/>
+              <a:gd name="connsiteY18" fmla="*/ 243298 h 1057030"/>
+              <a:gd name="connsiteX19" fmla="*/ 5268287 w 9269835"/>
+              <a:gd name="connsiteY19" fmla="*/ 218131 h 1057030"/>
+              <a:gd name="connsiteX20" fmla="*/ 5612235 w 9269835"/>
+              <a:gd name="connsiteY20" fmla="*/ 226520 h 1057030"/>
+              <a:gd name="connsiteX21" fmla="*/ 5729681 w 9269835"/>
+              <a:gd name="connsiteY21" fmla="*/ 243298 h 1057030"/>
+              <a:gd name="connsiteX22" fmla="*/ 5981351 w 9269835"/>
+              <a:gd name="connsiteY22" fmla="*/ 268465 h 1057030"/>
+              <a:gd name="connsiteX23" fmla="*/ 6367244 w 9269835"/>
+              <a:gd name="connsiteY23" fmla="*/ 327187 h 1057030"/>
+              <a:gd name="connsiteX24" fmla="*/ 7164198 w 9269835"/>
+              <a:gd name="connsiteY24" fmla="*/ 318798 h 1057030"/>
+              <a:gd name="connsiteX25" fmla="*/ 7466202 w 9269835"/>
+              <a:gd name="connsiteY25" fmla="*/ 276854 h 1057030"/>
+              <a:gd name="connsiteX26" fmla="*/ 7575259 w 9269835"/>
+              <a:gd name="connsiteY26" fmla="*/ 268465 h 1057030"/>
+              <a:gd name="connsiteX27" fmla="*/ 7852096 w 9269835"/>
+              <a:gd name="connsiteY27" fmla="*/ 243298 h 1057030"/>
+              <a:gd name="connsiteX28" fmla="*/ 7961153 w 9269835"/>
+              <a:gd name="connsiteY28" fmla="*/ 226520 h 1057030"/>
+              <a:gd name="connsiteX29" fmla="*/ 8506437 w 9269835"/>
+              <a:gd name="connsiteY29" fmla="*/ 176186 h 1057030"/>
+              <a:gd name="connsiteX30" fmla="*/ 9034943 w 9269835"/>
+              <a:gd name="connsiteY30" fmla="*/ 50351 h 1057030"/>
+              <a:gd name="connsiteX31" fmla="*/ 9177556 w 9269835"/>
+              <a:gd name="connsiteY31" fmla="*/ 16795 h 1057030"/>
+              <a:gd name="connsiteX32" fmla="*/ 9269835 w 9269835"/>
+              <a:gd name="connsiteY32" fmla="*/ 17 h 1057030"/>
+            </a:gdLst>
+            <a:ahLst/>
+            <a:cxnLst>
+              <a:cxn ang="0">
+                <a:pos x="connsiteX0" y="connsiteY0"/>
+              </a:cxn>
+              <a:cxn ang="0">
+                <a:pos x="connsiteX1" y="connsiteY1"/>
+              </a:cxn>
+              <a:cxn ang="0">
+                <a:pos x="connsiteX2" y="connsiteY2"/>
+              </a:cxn>
+              <a:cxn ang="0">
+                <a:pos x="connsiteX3" y="connsiteY3"/>
+              </a:cxn>
+              <a:cxn ang="0">
+                <a:pos x="connsiteX4" y="connsiteY4"/>
+              </a:cxn>
+              <a:cxn ang="0">
+                <a:pos x="connsiteX5" y="connsiteY5"/>
+              </a:cxn>
+              <a:cxn ang="0">
+                <a:pos x="connsiteX6" y="connsiteY6"/>
+              </a:cxn>
+              <a:cxn ang="0">
+                <a:pos x="connsiteX7" y="connsiteY7"/>
+              </a:cxn>
+              <a:cxn ang="0">
+                <a:pos x="connsiteX8" y="connsiteY8"/>
+              </a:cxn>
+              <a:cxn ang="0">
+                <a:pos x="connsiteX9" y="connsiteY9"/>
+              </a:cxn>
+              <a:cxn ang="0">
+                <a:pos x="connsiteX10" y="connsiteY10"/>
+              </a:cxn>
+              <a:cxn ang="0">
+                <a:pos x="connsiteX11" y="connsiteY11"/>
+              </a:cxn>
+              <a:cxn ang="0">
+                <a:pos x="connsiteX12" y="connsiteY12"/>
+              </a:cxn>
+              <a:cxn ang="0">
+                <a:pos x="connsiteX13" y="connsiteY13"/>
+              </a:cxn>
+              <a:cxn ang="0">
+                <a:pos x="connsiteX14" y="connsiteY14"/>
+              </a:cxn>
+              <a:cxn ang="0">
+                <a:pos x="connsiteX15" y="connsiteY15"/>
+              </a:cxn>
+              <a:cxn ang="0">
+                <a:pos x="connsiteX16" y="connsiteY16"/>
+              </a:cxn>
+              <a:cxn ang="0">
+                <a:pos x="connsiteX17" y="connsiteY17"/>
+              </a:cxn>
+              <a:cxn ang="0">
+                <a:pos x="connsiteX18" y="connsiteY18"/>
+              </a:cxn>
+              <a:cxn ang="0">
+                <a:pos x="connsiteX19" y="connsiteY19"/>
+              </a:cxn>
+              <a:cxn ang="0">
+                <a:pos x="connsiteX20" y="connsiteY20"/>
+              </a:cxn>
+              <a:cxn ang="0">
+                <a:pos x="connsiteX21" y="connsiteY21"/>
+              </a:cxn>
+              <a:cxn ang="0">
+                <a:pos x="connsiteX22" y="connsiteY22"/>
+              </a:cxn>
+              <a:cxn ang="0">
+                <a:pos x="connsiteX23" y="connsiteY23"/>
+              </a:cxn>
+              <a:cxn ang="0">
+                <a:pos x="connsiteX24" y="connsiteY24"/>
+              </a:cxn>
+              <a:cxn ang="0">
+                <a:pos x="connsiteX25" y="connsiteY25"/>
+              </a:cxn>
+              <a:cxn ang="0">
+                <a:pos x="connsiteX26" y="connsiteY26"/>
+              </a:cxn>
+              <a:cxn ang="0">
+                <a:pos x="connsiteX27" y="connsiteY27"/>
+              </a:cxn>
+              <a:cxn ang="0">
+                <a:pos x="connsiteX28" y="connsiteY28"/>
+              </a:cxn>
+              <a:cxn ang="0">
+                <a:pos x="connsiteX29" y="connsiteY29"/>
+              </a:cxn>
+              <a:cxn ang="0">
+                <a:pos x="connsiteX30" y="connsiteY30"/>
+              </a:cxn>
+              <a:cxn ang="0">
+                <a:pos x="connsiteX31" y="connsiteY31"/>
+              </a:cxn>
+              <a:cxn ang="0">
+                <a:pos x="connsiteX32" y="connsiteY32"/>
+              </a:cxn>
+            </a:cxnLst>
+            <a:rect l="l" t="t" r="r" b="b"/>
+            <a:pathLst>
+              <a:path w="9269835" h="1057030">
+                <a:moveTo>
+                  <a:pt x="0" y="1057030"/>
+                </a:moveTo>
+                <a:cubicBezTo>
+                  <a:pt x="19574" y="1051437"/>
+                  <a:pt x="38706" y="1043959"/>
+                  <a:pt x="58723" y="1040252"/>
+                </a:cubicBezTo>
+                <a:cubicBezTo>
+                  <a:pt x="232575" y="1008057"/>
+                  <a:pt x="255271" y="1014537"/>
+                  <a:pt x="444617" y="998307"/>
+                </a:cubicBezTo>
+                <a:cubicBezTo>
+                  <a:pt x="678169" y="978288"/>
+                  <a:pt x="246771" y="999344"/>
+                  <a:pt x="763398" y="981529"/>
+                </a:cubicBezTo>
+                <a:cubicBezTo>
+                  <a:pt x="1296519" y="926379"/>
+                  <a:pt x="769470" y="973427"/>
+                  <a:pt x="1719743" y="947973"/>
+                </a:cubicBezTo>
+                <a:cubicBezTo>
+                  <a:pt x="1795424" y="945946"/>
+                  <a:pt x="1870627" y="934854"/>
+                  <a:pt x="1946246" y="931195"/>
+                </a:cubicBezTo>
+                <a:cubicBezTo>
+                  <a:pt x="2044043" y="926463"/>
+                  <a:pt x="2141989" y="925602"/>
+                  <a:pt x="2239861" y="922806"/>
+                </a:cubicBezTo>
+                <a:lnTo>
+                  <a:pt x="2390863" y="906028"/>
+                </a:lnTo>
+                <a:cubicBezTo>
+                  <a:pt x="2696230" y="877753"/>
+                  <a:pt x="2608992" y="894041"/>
+                  <a:pt x="2818701" y="864083"/>
+                </a:cubicBezTo>
+                <a:cubicBezTo>
+                  <a:pt x="2894259" y="853289"/>
+                  <a:pt x="2970483" y="846094"/>
+                  <a:pt x="3045204" y="830527"/>
+                </a:cubicBezTo>
+                <a:cubicBezTo>
+                  <a:pt x="3405315" y="755504"/>
+                  <a:pt x="3094503" y="794290"/>
+                  <a:pt x="3296874" y="771804"/>
+                </a:cubicBezTo>
+                <a:cubicBezTo>
+                  <a:pt x="3322041" y="760619"/>
+                  <a:pt x="3346248" y="746957"/>
+                  <a:pt x="3372375" y="738248"/>
+                </a:cubicBezTo>
+                <a:cubicBezTo>
+                  <a:pt x="3552727" y="678130"/>
+                  <a:pt x="3475328" y="714876"/>
+                  <a:pt x="3624044" y="671136"/>
+                </a:cubicBezTo>
+                <a:cubicBezTo>
+                  <a:pt x="3638491" y="666887"/>
+                  <a:pt x="3651703" y="659120"/>
+                  <a:pt x="3665989" y="654358"/>
+                </a:cubicBezTo>
+                <a:cubicBezTo>
+                  <a:pt x="3676927" y="650712"/>
+                  <a:pt x="3688663" y="649778"/>
+                  <a:pt x="3699545" y="645969"/>
+                </a:cubicBezTo>
+                <a:cubicBezTo>
+                  <a:pt x="3902047" y="575093"/>
+                  <a:pt x="3915332" y="551032"/>
+                  <a:pt x="4186107" y="469800"/>
+                </a:cubicBezTo>
+                <a:cubicBezTo>
+                  <a:pt x="4242034" y="453022"/>
+                  <a:pt x="4298494" y="437930"/>
+                  <a:pt x="4353887" y="419466"/>
+                </a:cubicBezTo>
+                <a:cubicBezTo>
+                  <a:pt x="4562346" y="349979"/>
+                  <a:pt x="4411679" y="383029"/>
+                  <a:pt x="4580389" y="352354"/>
+                </a:cubicBezTo>
+                <a:cubicBezTo>
+                  <a:pt x="4746762" y="285805"/>
+                  <a:pt x="4726129" y="288916"/>
+                  <a:pt x="4999839" y="243298"/>
+                </a:cubicBezTo>
+                <a:cubicBezTo>
+                  <a:pt x="5088491" y="228523"/>
+                  <a:pt x="5178804" y="226520"/>
+                  <a:pt x="5268287" y="218131"/>
+                </a:cubicBezTo>
+                <a:cubicBezTo>
+                  <a:pt x="5382936" y="220927"/>
+                  <a:pt x="5497722" y="220274"/>
+                  <a:pt x="5612235" y="226520"/>
+                </a:cubicBezTo>
+                <a:cubicBezTo>
+                  <a:pt x="5651722" y="228674"/>
+                  <a:pt x="5690388" y="238833"/>
+                  <a:pt x="5729681" y="243298"/>
+                </a:cubicBezTo>
+                <a:cubicBezTo>
+                  <a:pt x="5813450" y="252817"/>
+                  <a:pt x="5897655" y="258320"/>
+                  <a:pt x="5981351" y="268465"/>
+                </a:cubicBezTo>
+                <a:cubicBezTo>
+                  <a:pt x="6237512" y="299514"/>
+                  <a:pt x="6204482" y="294635"/>
+                  <a:pt x="6367244" y="327187"/>
+                </a:cubicBezTo>
+                <a:lnTo>
+                  <a:pt x="7164198" y="318798"/>
+                </a:lnTo>
+                <a:cubicBezTo>
+                  <a:pt x="7272703" y="315917"/>
+                  <a:pt x="7359166" y="290665"/>
+                  <a:pt x="7466202" y="276854"/>
+                </a:cubicBezTo>
+                <a:cubicBezTo>
+                  <a:pt x="7502362" y="272188"/>
+                  <a:pt x="7538936" y="271623"/>
+                  <a:pt x="7575259" y="268465"/>
+                </a:cubicBezTo>
+                <a:lnTo>
+                  <a:pt x="7852096" y="243298"/>
+                </a:lnTo>
+                <a:cubicBezTo>
+                  <a:pt x="7888661" y="239324"/>
+                  <a:pt x="7924615" y="230736"/>
+                  <a:pt x="7961153" y="226520"/>
+                </a:cubicBezTo>
+                <a:cubicBezTo>
+                  <a:pt x="8227627" y="195773"/>
+                  <a:pt x="8267638" y="194555"/>
+                  <a:pt x="8506437" y="176186"/>
+                </a:cubicBezTo>
+                <a:cubicBezTo>
+                  <a:pt x="8815402" y="81120"/>
+                  <a:pt x="8340923" y="223856"/>
+                  <a:pt x="9034943" y="50351"/>
+                </a:cubicBezTo>
+                <a:cubicBezTo>
+                  <a:pt x="9223055" y="3323"/>
+                  <a:pt x="9071349" y="39554"/>
+                  <a:pt x="9177556" y="16795"/>
+                </a:cubicBezTo>
+                <a:cubicBezTo>
+                  <a:pt x="9261515" y="-1196"/>
+                  <a:pt x="9226626" y="17"/>
+                  <a:pt x="9269835" y="17"/>
+                </a:cubicBezTo>
+              </a:path>
+            </a:pathLst>
+          </a:custGeom>
+          <a:noFill/>
+        </p:spPr>
+        <p:style>
+          <a:lnRef idx="2">
+            <a:schemeClr val="accent1">
+              <a:shade val="50000"/>
+            </a:schemeClr>
+          </a:lnRef>
+          <a:fillRef idx="1">
+            <a:schemeClr val="accent1"/>
+          </a:fillRef>
+          <a:effectRef idx="0">
+            <a:schemeClr val="accent1"/>
+          </a:effectRef>
+          <a:fontRef idx="minor">
+            <a:schemeClr val="lt1"/>
+          </a:fontRef>
+        </p:style>
+        <p:txBody>
+          <a:bodyPr rtlCol="0" anchor="ctr"/>
+          <a:lstStyle/>
+          <a:p>
+            <a:pPr algn="ctr"/>
+            <a:endParaRPr lang="en-IL"/>
+          </a:p>
+        </p:txBody>
+      </p:sp>
+      <p:cxnSp>
+        <p:nvCxnSpPr>
+          <p:cNvPr id="7" name="Straight Arrow Connector 6">
+            <a:extLst>
+              <a:ext uri="{FF2B5EF4-FFF2-40B4-BE49-F238E27FC236}">
+                <a16:creationId xmlns:a16="http://schemas.microsoft.com/office/drawing/2014/main" id="{B45C4EA0-4FE6-4C74-B86F-D4BCE6DFFB68}"/>
+              </a:ext>
+            </a:extLst>
+          </p:cNvPr>
+          <p:cNvCxnSpPr/>
+          <p:nvPr/>
+        </p:nvCxnSpPr>
+        <p:spPr>
+          <a:xfrm>
+            <a:off x="4882393" y="2701255"/>
+            <a:ext cx="385893" cy="629174"/>
+          </a:xfrm>
+          <a:prstGeom prst="straightConnector1">
+            <a:avLst/>
+          </a:prstGeom>
+          <a:ln>
+            <a:tailEnd type="triangle"/>
+          </a:ln>
+        </p:spPr>
+        <p:style>
+          <a:lnRef idx="1">
+            <a:schemeClr val="accent1"/>
+          </a:lnRef>
+          <a:fillRef idx="0">
+            <a:schemeClr val="accent1"/>
+          </a:fillRef>
+          <a:effectRef idx="0">
+            <a:schemeClr val="accent1"/>
+          </a:effectRef>
+          <a:fontRef idx="minor">
+            <a:schemeClr val="tx1"/>
+          </a:fontRef>
+        </p:style>
+      </p:cxnSp>
+    </p:spTree>
+    <p:extLst>
+      <p:ext uri="{BB962C8B-B14F-4D97-AF65-F5344CB8AC3E}">
+        <p14:creationId xmlns:p14="http://schemas.microsoft.com/office/powerpoint/2010/main" val="385511603"/>
+      </p:ext>
+    </p:extLst>
+  </p:cSld>
+  <p:clrMapOvr>
+    <a:masterClrMapping/>
+  </p:clrMapOvr>
 </p:sld>
 </file>
 

</xml_diff>